<commit_message>
update video course cover
</commit_message>
<xml_diff>
--- a/CodingMath/codingmath-covers.pptx
+++ b/CodingMath/codingmath-covers.pptx
@@ -5,38 +5,39 @@
     <p:sldMasterId id="2147483725" r:id="rId4"/>
   </p:sldMasterIdLst>
   <p:notesMasterIdLst>
-    <p:notesMasterId r:id="rId31"/>
+    <p:notesMasterId r:id="rId32"/>
   </p:notesMasterIdLst>
   <p:handoutMasterIdLst>
-    <p:handoutMasterId r:id="rId32"/>
+    <p:handoutMasterId r:id="rId33"/>
   </p:handoutMasterIdLst>
   <p:sldIdLst>
-    <p:sldId id="339" r:id="rId5"/>
-    <p:sldId id="340" r:id="rId6"/>
-    <p:sldId id="341" r:id="rId7"/>
-    <p:sldId id="342" r:id="rId8"/>
-    <p:sldId id="344" r:id="rId9"/>
-    <p:sldId id="343" r:id="rId10"/>
-    <p:sldId id="345" r:id="rId11"/>
-    <p:sldId id="346" r:id="rId12"/>
-    <p:sldId id="347" r:id="rId13"/>
-    <p:sldId id="348" r:id="rId14"/>
-    <p:sldId id="349" r:id="rId15"/>
-    <p:sldId id="350" r:id="rId16"/>
-    <p:sldId id="351" r:id="rId17"/>
-    <p:sldId id="352" r:id="rId18"/>
-    <p:sldId id="353" r:id="rId19"/>
-    <p:sldId id="354" r:id="rId20"/>
-    <p:sldId id="355" r:id="rId21"/>
-    <p:sldId id="356" r:id="rId22"/>
-    <p:sldId id="357" r:id="rId23"/>
-    <p:sldId id="358" r:id="rId24"/>
-    <p:sldId id="359" r:id="rId25"/>
-    <p:sldId id="360" r:id="rId26"/>
-    <p:sldId id="361" r:id="rId27"/>
-    <p:sldId id="362" r:id="rId28"/>
-    <p:sldId id="364" r:id="rId29"/>
-    <p:sldId id="363" r:id="rId30"/>
+    <p:sldId id="365" r:id="rId5"/>
+    <p:sldId id="339" r:id="rId6"/>
+    <p:sldId id="340" r:id="rId7"/>
+    <p:sldId id="341" r:id="rId8"/>
+    <p:sldId id="342" r:id="rId9"/>
+    <p:sldId id="344" r:id="rId10"/>
+    <p:sldId id="343" r:id="rId11"/>
+    <p:sldId id="345" r:id="rId12"/>
+    <p:sldId id="346" r:id="rId13"/>
+    <p:sldId id="347" r:id="rId14"/>
+    <p:sldId id="348" r:id="rId15"/>
+    <p:sldId id="349" r:id="rId16"/>
+    <p:sldId id="350" r:id="rId17"/>
+    <p:sldId id="351" r:id="rId18"/>
+    <p:sldId id="352" r:id="rId19"/>
+    <p:sldId id="353" r:id="rId20"/>
+    <p:sldId id="354" r:id="rId21"/>
+    <p:sldId id="355" r:id="rId22"/>
+    <p:sldId id="356" r:id="rId23"/>
+    <p:sldId id="357" r:id="rId24"/>
+    <p:sldId id="358" r:id="rId25"/>
+    <p:sldId id="359" r:id="rId26"/>
+    <p:sldId id="360" r:id="rId27"/>
+    <p:sldId id="361" r:id="rId28"/>
+    <p:sldId id="362" r:id="rId29"/>
+    <p:sldId id="364" r:id="rId30"/>
+    <p:sldId id="363" r:id="rId31"/>
   </p:sldIdLst>
   <p:sldSz cx="12192000" cy="6858000"/>
   <p:notesSz cx="6858000" cy="9144000"/>
@@ -257,7 +258,7 @@
           <a:p>
             <a:fld id="{7BA37F7A-782D-430C-B7DE-046B665BEF14}" type="datetimeFigureOut">
               <a:rPr lang="en-US" smtClean="0"/>
-              <a:t>3/22/2024</a:t>
+              <a:t>3/27/2024</a:t>
             </a:fld>
             <a:endParaRPr lang="en-US" dirty="0"/>
           </a:p>
@@ -434,7 +435,7 @@
           <a:p>
             <a:fld id="{B61CCEED-E5F4-4698-B012-83262916D7BD}" type="datetimeFigureOut">
               <a:rPr lang="en-US" noProof="0" smtClean="0"/>
-              <a:t>3/22/2024</a:t>
+              <a:t>3/27/2024</a:t>
             </a:fld>
             <a:endParaRPr lang="en-US" noProof="0" dirty="0"/>
           </a:p>
@@ -766,7 +767,7 @@
           <a:p>
             <a:fld id="{69D2F9AB-3C90-481E-8C34-4F549BF455D7}" type="slidenum">
               <a:rPr lang="en-US" noProof="0" smtClean="0"/>
-              <a:t>1</a:t>
+              <a:t>2</a:t>
             </a:fld>
             <a:endParaRPr lang="en-US" noProof="0" dirty="0"/>
           </a:p>
@@ -850,7 +851,7 @@
           <a:p>
             <a:fld id="{69D2F9AB-3C90-481E-8C34-4F549BF455D7}" type="slidenum">
               <a:rPr lang="en-US" noProof="0" smtClean="0"/>
-              <a:t>10</a:t>
+              <a:t>11</a:t>
             </a:fld>
             <a:endParaRPr lang="en-US" noProof="0" dirty="0"/>
           </a:p>
@@ -934,7 +935,7 @@
           <a:p>
             <a:fld id="{69D2F9AB-3C90-481E-8C34-4F549BF455D7}" type="slidenum">
               <a:rPr lang="en-US" noProof="0" smtClean="0"/>
-              <a:t>11</a:t>
+              <a:t>12</a:t>
             </a:fld>
             <a:endParaRPr lang="en-US" noProof="0" dirty="0"/>
           </a:p>
@@ -1018,7 +1019,7 @@
           <a:p>
             <a:fld id="{69D2F9AB-3C90-481E-8C34-4F549BF455D7}" type="slidenum">
               <a:rPr lang="en-US" noProof="0" smtClean="0"/>
-              <a:t>12</a:t>
+              <a:t>13</a:t>
             </a:fld>
             <a:endParaRPr lang="en-US" noProof="0" dirty="0"/>
           </a:p>
@@ -1102,7 +1103,7 @@
           <a:p>
             <a:fld id="{69D2F9AB-3C90-481E-8C34-4F549BF455D7}" type="slidenum">
               <a:rPr lang="en-US" noProof="0" smtClean="0"/>
-              <a:t>13</a:t>
+              <a:t>14</a:t>
             </a:fld>
             <a:endParaRPr lang="en-US" noProof="0" dirty="0"/>
           </a:p>
@@ -1186,7 +1187,7 @@
           <a:p>
             <a:fld id="{69D2F9AB-3C90-481E-8C34-4F549BF455D7}" type="slidenum">
               <a:rPr lang="en-US" noProof="0" smtClean="0"/>
-              <a:t>14</a:t>
+              <a:t>15</a:t>
             </a:fld>
             <a:endParaRPr lang="en-US" noProof="0" dirty="0"/>
           </a:p>
@@ -1270,7 +1271,7 @@
           <a:p>
             <a:fld id="{69D2F9AB-3C90-481E-8C34-4F549BF455D7}" type="slidenum">
               <a:rPr lang="en-US" noProof="0" smtClean="0"/>
-              <a:t>15</a:t>
+              <a:t>16</a:t>
             </a:fld>
             <a:endParaRPr lang="en-US" noProof="0" dirty="0"/>
           </a:p>
@@ -1354,7 +1355,7 @@
           <a:p>
             <a:fld id="{69D2F9AB-3C90-481E-8C34-4F549BF455D7}" type="slidenum">
               <a:rPr lang="en-US" noProof="0" smtClean="0"/>
-              <a:t>16</a:t>
+              <a:t>17</a:t>
             </a:fld>
             <a:endParaRPr lang="en-US" noProof="0" dirty="0"/>
           </a:p>
@@ -1438,7 +1439,7 @@
           <a:p>
             <a:fld id="{69D2F9AB-3C90-481E-8C34-4F549BF455D7}" type="slidenum">
               <a:rPr lang="en-US" noProof="0" smtClean="0"/>
-              <a:t>17</a:t>
+              <a:t>18</a:t>
             </a:fld>
             <a:endParaRPr lang="en-US" noProof="0" dirty="0"/>
           </a:p>
@@ -1522,7 +1523,7 @@
           <a:p>
             <a:fld id="{69D2F9AB-3C90-481E-8C34-4F549BF455D7}" type="slidenum">
               <a:rPr lang="en-US" noProof="0" smtClean="0"/>
-              <a:t>18</a:t>
+              <a:t>19</a:t>
             </a:fld>
             <a:endParaRPr lang="en-US" noProof="0" dirty="0"/>
           </a:p>
@@ -1606,7 +1607,7 @@
           <a:p>
             <a:fld id="{69D2F9AB-3C90-481E-8C34-4F549BF455D7}" type="slidenum">
               <a:rPr lang="en-US" noProof="0" smtClean="0"/>
-              <a:t>19</a:t>
+              <a:t>20</a:t>
             </a:fld>
             <a:endParaRPr lang="en-US" noProof="0" dirty="0"/>
           </a:p>
@@ -1690,7 +1691,7 @@
           <a:p>
             <a:fld id="{69D2F9AB-3C90-481E-8C34-4F549BF455D7}" type="slidenum">
               <a:rPr lang="en-US" noProof="0" smtClean="0"/>
-              <a:t>2</a:t>
+              <a:t>3</a:t>
             </a:fld>
             <a:endParaRPr lang="en-US" noProof="0" dirty="0"/>
           </a:p>
@@ -1774,7 +1775,7 @@
           <a:p>
             <a:fld id="{69D2F9AB-3C90-481E-8C34-4F549BF455D7}" type="slidenum">
               <a:rPr lang="en-US" noProof="0" smtClean="0"/>
-              <a:t>20</a:t>
+              <a:t>21</a:t>
             </a:fld>
             <a:endParaRPr lang="en-US" noProof="0" dirty="0"/>
           </a:p>
@@ -1858,7 +1859,7 @@
           <a:p>
             <a:fld id="{69D2F9AB-3C90-481E-8C34-4F549BF455D7}" type="slidenum">
               <a:rPr lang="en-US" noProof="0" smtClean="0"/>
-              <a:t>21</a:t>
+              <a:t>22</a:t>
             </a:fld>
             <a:endParaRPr lang="en-US" noProof="0" dirty="0"/>
           </a:p>
@@ -1942,7 +1943,7 @@
           <a:p>
             <a:fld id="{69D2F9AB-3C90-481E-8C34-4F549BF455D7}" type="slidenum">
               <a:rPr lang="en-US" noProof="0" smtClean="0"/>
-              <a:t>22</a:t>
+              <a:t>23</a:t>
             </a:fld>
             <a:endParaRPr lang="en-US" noProof="0" dirty="0"/>
           </a:p>
@@ -2026,7 +2027,7 @@
           <a:p>
             <a:fld id="{69D2F9AB-3C90-481E-8C34-4F549BF455D7}" type="slidenum">
               <a:rPr lang="en-US" noProof="0" smtClean="0"/>
-              <a:t>23</a:t>
+              <a:t>24</a:t>
             </a:fld>
             <a:endParaRPr lang="en-US" noProof="0" dirty="0"/>
           </a:p>
@@ -2110,7 +2111,7 @@
           <a:p>
             <a:fld id="{69D2F9AB-3C90-481E-8C34-4F549BF455D7}" type="slidenum">
               <a:rPr lang="en-US" noProof="0" smtClean="0"/>
-              <a:t>24</a:t>
+              <a:t>25</a:t>
             </a:fld>
             <a:endParaRPr lang="en-US" noProof="0" dirty="0"/>
           </a:p>
@@ -2194,7 +2195,7 @@
           <a:p>
             <a:fld id="{69D2F9AB-3C90-481E-8C34-4F549BF455D7}" type="slidenum">
               <a:rPr lang="en-US" noProof="0" smtClean="0"/>
-              <a:t>25</a:t>
+              <a:t>26</a:t>
             </a:fld>
             <a:endParaRPr lang="en-US" noProof="0" dirty="0"/>
           </a:p>
@@ -2278,7 +2279,7 @@
           <a:p>
             <a:fld id="{69D2F9AB-3C90-481E-8C34-4F549BF455D7}" type="slidenum">
               <a:rPr lang="en-US" noProof="0" smtClean="0"/>
-              <a:t>26</a:t>
+              <a:t>27</a:t>
             </a:fld>
             <a:endParaRPr lang="en-US" noProof="0" dirty="0"/>
           </a:p>
@@ -2362,7 +2363,7 @@
           <a:p>
             <a:fld id="{69D2F9AB-3C90-481E-8C34-4F549BF455D7}" type="slidenum">
               <a:rPr lang="en-US" noProof="0" smtClean="0"/>
-              <a:t>3</a:t>
+              <a:t>4</a:t>
             </a:fld>
             <a:endParaRPr lang="en-US" noProof="0" dirty="0"/>
           </a:p>
@@ -2446,7 +2447,7 @@
           <a:p>
             <a:fld id="{69D2F9AB-3C90-481E-8C34-4F549BF455D7}" type="slidenum">
               <a:rPr lang="en-US" noProof="0" smtClean="0"/>
-              <a:t>4</a:t>
+              <a:t>5</a:t>
             </a:fld>
             <a:endParaRPr lang="en-US" noProof="0" dirty="0"/>
           </a:p>
@@ -2530,7 +2531,7 @@
           <a:p>
             <a:fld id="{69D2F9AB-3C90-481E-8C34-4F549BF455D7}" type="slidenum">
               <a:rPr lang="en-US" noProof="0" smtClean="0"/>
-              <a:t>5</a:t>
+              <a:t>6</a:t>
             </a:fld>
             <a:endParaRPr lang="en-US" noProof="0" dirty="0"/>
           </a:p>
@@ -2614,7 +2615,7 @@
           <a:p>
             <a:fld id="{69D2F9AB-3C90-481E-8C34-4F549BF455D7}" type="slidenum">
               <a:rPr lang="en-US" noProof="0" smtClean="0"/>
-              <a:t>6</a:t>
+              <a:t>7</a:t>
             </a:fld>
             <a:endParaRPr lang="en-US" noProof="0" dirty="0"/>
           </a:p>
@@ -2698,7 +2699,7 @@
           <a:p>
             <a:fld id="{69D2F9AB-3C90-481E-8C34-4F549BF455D7}" type="slidenum">
               <a:rPr lang="en-US" noProof="0" smtClean="0"/>
-              <a:t>7</a:t>
+              <a:t>8</a:t>
             </a:fld>
             <a:endParaRPr lang="en-US" noProof="0" dirty="0"/>
           </a:p>
@@ -2782,7 +2783,7 @@
           <a:p>
             <a:fld id="{69D2F9AB-3C90-481E-8C34-4F549BF455D7}" type="slidenum">
               <a:rPr lang="en-US" noProof="0" smtClean="0"/>
-              <a:t>8</a:t>
+              <a:t>9</a:t>
             </a:fld>
             <a:endParaRPr lang="en-US" noProof="0" dirty="0"/>
           </a:p>
@@ -2866,7 +2867,7 @@
           <a:p>
             <a:fld id="{69D2F9AB-3C90-481E-8C34-4F549BF455D7}" type="slidenum">
               <a:rPr lang="en-US" noProof="0" smtClean="0"/>
-              <a:t>9</a:t>
+              <a:t>10</a:t>
             </a:fld>
             <a:endParaRPr lang="en-US" noProof="0" dirty="0"/>
           </a:p>
@@ -8615,7 +8616,7 @@
           <a:p>
             <a:fld id="{91CD4B7E-D172-41E4-BE36-64B5A7E393CD}" type="datetimeFigureOut">
               <a:rPr lang="en-US" noProof="0" smtClean="0"/>
-              <a:t>3/22/2024</a:t>
+              <a:t>3/27/2024</a:t>
             </a:fld>
             <a:endParaRPr lang="en-US" noProof="0" dirty="0"/>
           </a:p>
@@ -19297,7 +19298,7 @@
             <a:fld id="{0A7F1CA9-BED2-4756-8AEF-E0F68B0488B6}" type="datetime1">
               <a:rPr lang="en-US" smtClean="0"/>
               <a:pPr/>
-              <a:t>3/22/2024</a:t>
+              <a:t>3/27/2024</a:t>
             </a:fld>
             <a:endParaRPr lang="en-US" dirty="0"/>
           </a:p>
@@ -19793,121 +19794,12 @@
           <a:chExt cx="0" cy="0"/>
         </a:xfrm>
       </p:grpSpPr>
-      <p:sp>
-        <p:nvSpPr>
-          <p:cNvPr id="17" name="Title 16">
-            <a:extLst>
-              <a:ext uri="{FF2B5EF4-FFF2-40B4-BE49-F238E27FC236}">
-                <a16:creationId xmlns:a16="http://schemas.microsoft.com/office/drawing/2014/main" id="{2A7A4DC1-E50C-440F-5AAD-B8FF3E74FA45}"/>
-              </a:ext>
-            </a:extLst>
-          </p:cNvPr>
-          <p:cNvSpPr>
-            <a:spLocks noGrp="1"/>
-          </p:cNvSpPr>
-          <p:nvPr>
-            <p:ph type="title"/>
-          </p:nvPr>
-        </p:nvSpPr>
-        <p:spPr>
-          <a:xfrm>
-            <a:off x="344129" y="589938"/>
-            <a:ext cx="7159608" cy="3519949"/>
-          </a:xfrm>
-        </p:spPr>
-        <p:txBody>
-          <a:bodyPr/>
-          <a:lstStyle/>
-          <a:p>
-            <a:r>
-              <a:rPr lang="zh-CN" altLang="en-US" dirty="0"/>
-              <a:t>编程数学</a:t>
-            </a:r>
-            <a:br>
-              <a:rPr lang="en-US" altLang="zh-CN" dirty="0"/>
-            </a:br>
-            <a:r>
-              <a:rPr lang="en-US" altLang="zh-CN" sz="4800" dirty="0"/>
-              <a:t>Using Octave for Coding Mathematics</a:t>
-            </a:r>
-            <a:endParaRPr lang="en-US" dirty="0"/>
-          </a:p>
-        </p:txBody>
-      </p:sp>
-      <p:sp>
-        <p:nvSpPr>
-          <p:cNvPr id="18" name="Text Placeholder 17">
-            <a:extLst>
-              <a:ext uri="{FF2B5EF4-FFF2-40B4-BE49-F238E27FC236}">
-                <a16:creationId xmlns:a16="http://schemas.microsoft.com/office/drawing/2014/main" id="{D62CC159-4789-0E92-08AE-ECCAB12B677E}"/>
-              </a:ext>
-            </a:extLst>
-          </p:cNvPr>
-          <p:cNvSpPr>
-            <a:spLocks noGrp="1"/>
-          </p:cNvSpPr>
-          <p:nvPr>
-            <p:ph type="body" sz="quarter" idx="11"/>
-          </p:nvPr>
-        </p:nvSpPr>
-        <p:spPr>
-          <a:xfrm>
-            <a:off x="8801493" y="5547623"/>
-            <a:ext cx="3322638" cy="904824"/>
-          </a:xfrm>
-        </p:spPr>
-        <p:txBody>
-          <a:bodyPr/>
-          <a:lstStyle/>
-          <a:p>
-            <a:endParaRPr lang="en-US" dirty="0"/>
-          </a:p>
-        </p:txBody>
-      </p:sp>
       <p:pic>
         <p:nvPicPr>
-          <p:cNvPr id="5" name="Picture Placeholder 4" descr="A white box with green and white text&#10;&#10;Description automatically generated">
-            <a:extLst>
-              <a:ext uri="{FF2B5EF4-FFF2-40B4-BE49-F238E27FC236}">
-                <a16:creationId xmlns:a16="http://schemas.microsoft.com/office/drawing/2014/main" id="{57011ADA-E505-9929-FC52-3CA2113CB4CA}"/>
-              </a:ext>
-            </a:extLst>
-          </p:cNvPr>
-          <p:cNvPicPr>
-            <a:picLocks noGrp="1" noChangeAspect="1"/>
-          </p:cNvPicPr>
-          <p:nvPr>
-            <p:ph type="pic" sz="quarter" idx="10"/>
-          </p:nvPr>
-        </p:nvPicPr>
-        <p:blipFill>
-          <a:blip r:embed="rId3"/>
-          <a:stretch>
-            <a:fillRect/>
-          </a:stretch>
-        </p:blipFill>
-        <p:spPr>
-          <a:xfrm>
-            <a:off x="8245644" y="1810282"/>
-            <a:ext cx="2626370" cy="3237436"/>
-          </a:xfrm>
-          <a:prstGeom prst="rect">
-            <a:avLst/>
-          </a:prstGeom>
-          <a:ln>
-            <a:noFill/>
-          </a:ln>
-          <a:effectLst>
-            <a:softEdge rad="112500"/>
-          </a:effectLst>
-        </p:spPr>
-      </p:pic>
-      <p:pic>
-        <p:nvPicPr>
-          <p:cNvPr id="6" name="Picture 5">
-            <a:extLst>
-              <a:ext uri="{FF2B5EF4-FFF2-40B4-BE49-F238E27FC236}">
-                <a16:creationId xmlns:a16="http://schemas.microsoft.com/office/drawing/2014/main" id="{31D9A30F-7C62-08F0-1D61-6C98711B41A5}"/>
+          <p:cNvPr id="25" name="Picture 24">
+            <a:extLst>
+              <a:ext uri="{FF2B5EF4-FFF2-40B4-BE49-F238E27FC236}">
+                <a16:creationId xmlns:a16="http://schemas.microsoft.com/office/drawing/2014/main" id="{8FBAB6C3-AD92-1E0C-8065-C2D810410B57}"/>
               </a:ext>
             </a:extLst>
           </p:cNvPr>
@@ -19917,15 +19809,15 @@
           <p:nvPr/>
         </p:nvPicPr>
         <p:blipFill>
-          <a:blip r:embed="rId4"/>
+          <a:blip r:embed="rId2"/>
           <a:stretch>
             <a:fillRect/>
           </a:stretch>
         </p:blipFill>
         <p:spPr>
           <a:xfrm>
-            <a:off x="8975282" y="5690267"/>
-            <a:ext cx="2975059" cy="619535"/>
+            <a:off x="3456032" y="1773321"/>
+            <a:ext cx="5064697" cy="3729957"/>
           </a:xfrm>
           <a:prstGeom prst="rect">
             <a:avLst/>
@@ -19942,54 +19834,126 @@
           </a:effectLst>
         </p:spPr>
       </p:pic>
-      <p:sp>
-        <p:nvSpPr>
-          <p:cNvPr id="8" name="TextBox 7">
-            <a:extLst>
-              <a:ext uri="{FF2B5EF4-FFF2-40B4-BE49-F238E27FC236}">
-                <a16:creationId xmlns:a16="http://schemas.microsoft.com/office/drawing/2014/main" id="{A08B22CE-72AD-D68D-8B0E-91CE1ABDD3E0}"/>
-              </a:ext>
-            </a:extLst>
-          </p:cNvPr>
-          <p:cNvSpPr txBox="1"/>
+      <p:pic>
+        <p:nvPicPr>
+          <p:cNvPr id="21" name="Picture 20">
+            <a:extLst>
+              <a:ext uri="{FF2B5EF4-FFF2-40B4-BE49-F238E27FC236}">
+                <a16:creationId xmlns:a16="http://schemas.microsoft.com/office/drawing/2014/main" id="{4FBF7C37-FEBC-CD0C-B783-956F827C5FC8}"/>
+              </a:ext>
+            </a:extLst>
+          </p:cNvPr>
+          <p:cNvPicPr>
+            <a:picLocks noChangeAspect="1"/>
+          </p:cNvPicPr>
           <p:nvPr/>
-        </p:nvSpPr>
+        </p:nvPicPr>
+        <p:blipFill>
+          <a:blip r:embed="rId3"/>
+          <a:stretch>
+            <a:fillRect/>
+          </a:stretch>
+        </p:blipFill>
         <p:spPr>
           <a:xfrm>
-            <a:off x="241659" y="5744561"/>
-            <a:ext cx="6953052" cy="707886"/>
+            <a:off x="4348436" y="2354577"/>
+            <a:ext cx="3157980" cy="1965196"/>
           </a:xfrm>
           <a:prstGeom prst="rect">
             <a:avLst/>
           </a:prstGeom>
-          <a:solidFill>
-            <a:schemeClr val="bg1"/>
-          </a:solidFill>
-        </p:spPr>
-        <p:txBody>
-          <a:bodyPr wrap="square">
-            <a:spAutoFit/>
-          </a:bodyPr>
-          <a:lstStyle/>
-          <a:p>
-            <a:r>
-              <a:rPr lang="en-US" altLang="zh-CN" sz="2000" dirty="0"/>
-              <a:t>GitHub: </a:t>
-            </a:r>
-            <a:r>
-              <a:rPr lang="en-US" sz="2000" dirty="0">
-                <a:hlinkClick r:id="rId5"/>
-              </a:rPr>
-              <a:t>https://github.com/yasenstar/learn_octave/tree/main/CodingMath</a:t>
-            </a:r>
-            <a:endParaRPr lang="en-US" sz="2000" dirty="0"/>
-          </a:p>
-        </p:txBody>
-      </p:sp>
+          <a:ln>
+            <a:noFill/>
+          </a:ln>
+          <a:effectLst>
+            <a:softEdge rad="112500"/>
+          </a:effectLst>
+        </p:spPr>
+      </p:pic>
+      <p:pic>
+        <p:nvPicPr>
+          <p:cNvPr id="3" name="Picture 2">
+            <a:extLst>
+              <a:ext uri="{FF2B5EF4-FFF2-40B4-BE49-F238E27FC236}">
+                <a16:creationId xmlns:a16="http://schemas.microsoft.com/office/drawing/2014/main" id="{219C3351-8BEF-28FF-3272-25C0B534D1EE}"/>
+              </a:ext>
+            </a:extLst>
+          </p:cNvPr>
+          <p:cNvPicPr>
+            <a:picLocks noChangeAspect="1"/>
+          </p:cNvPicPr>
+          <p:nvPr/>
+        </p:nvPicPr>
+        <p:blipFill>
+          <a:blip r:embed="rId4"/>
+          <a:stretch>
+            <a:fillRect/>
+          </a:stretch>
+        </p:blipFill>
+        <p:spPr>
+          <a:xfrm>
+            <a:off x="8704417" y="3903061"/>
+            <a:ext cx="2114550" cy="1766875"/>
+          </a:xfrm>
+          <a:prstGeom prst="rect">
+            <a:avLst/>
+          </a:prstGeom>
+          <a:ln>
+            <a:noFill/>
+          </a:ln>
+          <a:effectLst>
+            <a:outerShdw blurRad="292100" dist="139700" dir="2700000" algn="tl" rotWithShape="0">
+              <a:srgbClr val="333333">
+                <a:alpha val="65000"/>
+              </a:srgbClr>
+            </a:outerShdw>
+          </a:effectLst>
+        </p:spPr>
+      </p:pic>
+      <p:pic>
+        <p:nvPicPr>
+          <p:cNvPr id="5" name="Picture 4">
+            <a:extLst>
+              <a:ext uri="{FF2B5EF4-FFF2-40B4-BE49-F238E27FC236}">
+                <a16:creationId xmlns:a16="http://schemas.microsoft.com/office/drawing/2014/main" id="{E2DE1D85-13DB-9996-D544-A1BEFC3B7ACC}"/>
+              </a:ext>
+            </a:extLst>
+          </p:cNvPr>
+          <p:cNvPicPr>
+            <a:picLocks noChangeAspect="1"/>
+          </p:cNvPicPr>
+          <p:nvPr/>
+        </p:nvPicPr>
+        <p:blipFill>
+          <a:blip r:embed="rId5"/>
+          <a:stretch>
+            <a:fillRect/>
+          </a:stretch>
+        </p:blipFill>
+        <p:spPr>
+          <a:xfrm>
+            <a:off x="8704416" y="1646913"/>
+            <a:ext cx="2114550" cy="2105025"/>
+          </a:xfrm>
+          <a:prstGeom prst="rect">
+            <a:avLst/>
+          </a:prstGeom>
+          <a:ln>
+            <a:noFill/>
+          </a:ln>
+          <a:effectLst>
+            <a:outerShdw blurRad="292100" dist="139700" dir="2700000" algn="tl" rotWithShape="0">
+              <a:srgbClr val="333333">
+                <a:alpha val="65000"/>
+              </a:srgbClr>
+            </a:outerShdw>
+          </a:effectLst>
+        </p:spPr>
+      </p:pic>
     </p:spTree>
     <p:extLst>
       <p:ext uri="{BB962C8B-B14F-4D97-AF65-F5344CB8AC3E}">
-        <p14:creationId xmlns:p14="http://schemas.microsoft.com/office/powerpoint/2010/main" val="172385740"/>
+        <p14:creationId xmlns:p14="http://schemas.microsoft.com/office/powerpoint/2010/main" val="1907809319"/>
       </p:ext>
     </p:extLst>
   </p:cSld>
@@ -20016,19 +19980,92 @@
           <a:chExt cx="0" cy="0"/>
         </a:xfrm>
       </p:grpSpPr>
+      <p:sp>
+        <p:nvSpPr>
+          <p:cNvPr id="17" name="Title 16">
+            <a:extLst>
+              <a:ext uri="{FF2B5EF4-FFF2-40B4-BE49-F238E27FC236}">
+                <a16:creationId xmlns:a16="http://schemas.microsoft.com/office/drawing/2014/main" id="{2A7A4DC1-E50C-440F-5AAD-B8FF3E74FA45}"/>
+              </a:ext>
+            </a:extLst>
+          </p:cNvPr>
+          <p:cNvSpPr>
+            <a:spLocks noGrp="1"/>
+          </p:cNvSpPr>
+          <p:nvPr>
+            <p:ph type="title"/>
+          </p:nvPr>
+        </p:nvSpPr>
+        <p:spPr>
+          <a:xfrm>
+            <a:off x="241659" y="335415"/>
+            <a:ext cx="5151698" cy="2219250"/>
+          </a:xfrm>
+        </p:spPr>
+        <p:txBody>
+          <a:bodyPr/>
+          <a:lstStyle/>
+          <a:p>
+            <a:r>
+              <a:rPr lang="zh-CN" altLang="en-US" sz="5400" dirty="0"/>
+              <a:t>编程数学</a:t>
+            </a:r>
+            <a:br>
+              <a:rPr lang="en-US" altLang="zh-CN" sz="5400" dirty="0"/>
+            </a:br>
+            <a:r>
+              <a:rPr lang="en-US" altLang="zh-CN" sz="3200" dirty="0"/>
+              <a:t>Using Octave for Coding Mathematics</a:t>
+            </a:r>
+            <a:endParaRPr lang="en-US" sz="5400" dirty="0"/>
+          </a:p>
+        </p:txBody>
+      </p:sp>
+      <p:sp>
+        <p:nvSpPr>
+          <p:cNvPr id="18" name="Text Placeholder 17">
+            <a:extLst>
+              <a:ext uri="{FF2B5EF4-FFF2-40B4-BE49-F238E27FC236}">
+                <a16:creationId xmlns:a16="http://schemas.microsoft.com/office/drawing/2014/main" id="{D62CC159-4789-0E92-08AE-ECCAB12B677E}"/>
+              </a:ext>
+            </a:extLst>
+          </p:cNvPr>
+          <p:cNvSpPr>
+            <a:spLocks noGrp="1"/>
+          </p:cNvSpPr>
+          <p:nvPr>
+            <p:ph type="body" sz="quarter" idx="11"/>
+          </p:nvPr>
+        </p:nvSpPr>
+        <p:spPr>
+          <a:xfrm>
+            <a:off x="8801493" y="5547623"/>
+            <a:ext cx="3322638" cy="904824"/>
+          </a:xfrm>
+        </p:spPr>
+        <p:txBody>
+          <a:bodyPr/>
+          <a:lstStyle/>
+          <a:p>
+            <a:endParaRPr lang="en-US" dirty="0"/>
+          </a:p>
+        </p:txBody>
+      </p:sp>
       <p:pic>
         <p:nvPicPr>
-          <p:cNvPr id="4" name="Picture 3">
-            <a:extLst>
-              <a:ext uri="{FF2B5EF4-FFF2-40B4-BE49-F238E27FC236}">
-                <a16:creationId xmlns:a16="http://schemas.microsoft.com/office/drawing/2014/main" id="{331C33D3-5A73-2E43-87EF-68E8D472DFC8}"/>
+          <p:cNvPr id="5" name="Picture Placeholder 4" descr="A white box with green and white text&#10;&#10;Description automatically generated">
+            <a:extLst>
+              <a:ext uri="{FF2B5EF4-FFF2-40B4-BE49-F238E27FC236}">
+                <a16:creationId xmlns:a16="http://schemas.microsoft.com/office/drawing/2014/main" id="{57011ADA-E505-9929-FC52-3CA2113CB4CA}"/>
               </a:ext>
             </a:extLst>
           </p:cNvPr>
           <p:cNvPicPr>
-            <a:picLocks noChangeAspect="1"/>
+            <a:picLocks noGrp="1" noChangeAspect="1"/>
           </p:cNvPicPr>
-          <p:nvPr/>
+          <p:nvPr>
+            <p:ph type="pic" sz="quarter" idx="10"/>
+          </p:nvPr>
         </p:nvPicPr>
         <p:blipFill>
           <a:blip r:embed="rId3"/>
@@ -20038,8 +20075,44 @@
         </p:blipFill>
         <p:spPr>
           <a:xfrm>
-            <a:off x="5981070" y="2632448"/>
-            <a:ext cx="6095999" cy="2720858"/>
+            <a:off x="4850447" y="244301"/>
+            <a:ext cx="1627238" cy="2005840"/>
+          </a:xfrm>
+          <a:prstGeom prst="rect">
+            <a:avLst/>
+          </a:prstGeom>
+          <a:ln>
+            <a:noFill/>
+          </a:ln>
+          <a:effectLst>
+            <a:softEdge rad="112500"/>
+          </a:effectLst>
+        </p:spPr>
+      </p:pic>
+      <p:pic>
+        <p:nvPicPr>
+          <p:cNvPr id="6" name="Picture 5">
+            <a:extLst>
+              <a:ext uri="{FF2B5EF4-FFF2-40B4-BE49-F238E27FC236}">
+                <a16:creationId xmlns:a16="http://schemas.microsoft.com/office/drawing/2014/main" id="{31D9A30F-7C62-08F0-1D61-6C98711B41A5}"/>
+              </a:ext>
+            </a:extLst>
+          </p:cNvPr>
+          <p:cNvPicPr>
+            <a:picLocks noChangeAspect="1"/>
+          </p:cNvPicPr>
+          <p:nvPr/>
+        </p:nvPicPr>
+        <p:blipFill>
+          <a:blip r:embed="rId4"/>
+          <a:stretch>
+            <a:fillRect/>
+          </a:stretch>
+        </p:blipFill>
+        <p:spPr>
+          <a:xfrm>
+            <a:off x="8975282" y="5690267"/>
+            <a:ext cx="2975059" cy="619535"/>
           </a:xfrm>
           <a:prstGeom prst="rect">
             <a:avLst/>
@@ -20058,155 +20131,6 @@
       </p:pic>
       <p:sp>
         <p:nvSpPr>
-          <p:cNvPr id="17" name="Title 16">
-            <a:extLst>
-              <a:ext uri="{FF2B5EF4-FFF2-40B4-BE49-F238E27FC236}">
-                <a16:creationId xmlns:a16="http://schemas.microsoft.com/office/drawing/2014/main" id="{2A7A4DC1-E50C-440F-5AAD-B8FF3E74FA45}"/>
-              </a:ext>
-            </a:extLst>
-          </p:cNvPr>
-          <p:cNvSpPr>
-            <a:spLocks noGrp="1"/>
-          </p:cNvSpPr>
-          <p:nvPr>
-            <p:ph type="title"/>
-          </p:nvPr>
-        </p:nvSpPr>
-        <p:spPr>
-          <a:xfrm>
-            <a:off x="241659" y="335415"/>
-            <a:ext cx="5151698" cy="2219250"/>
-          </a:xfrm>
-        </p:spPr>
-        <p:txBody>
-          <a:bodyPr/>
-          <a:lstStyle/>
-          <a:p>
-            <a:r>
-              <a:rPr lang="zh-CN" altLang="en-US" sz="5400" dirty="0"/>
-              <a:t>编程数学</a:t>
-            </a:r>
-            <a:br>
-              <a:rPr lang="en-US" altLang="zh-CN" sz="5400" dirty="0"/>
-            </a:br>
-            <a:r>
-              <a:rPr lang="en-US" altLang="zh-CN" sz="3200" dirty="0"/>
-              <a:t>Using Octave for Coding Mathematics</a:t>
-            </a:r>
-            <a:endParaRPr lang="en-US" sz="5400" dirty="0"/>
-          </a:p>
-        </p:txBody>
-      </p:sp>
-      <p:sp>
-        <p:nvSpPr>
-          <p:cNvPr id="18" name="Text Placeholder 17">
-            <a:extLst>
-              <a:ext uri="{FF2B5EF4-FFF2-40B4-BE49-F238E27FC236}">
-                <a16:creationId xmlns:a16="http://schemas.microsoft.com/office/drawing/2014/main" id="{D62CC159-4789-0E92-08AE-ECCAB12B677E}"/>
-              </a:ext>
-            </a:extLst>
-          </p:cNvPr>
-          <p:cNvSpPr>
-            <a:spLocks noGrp="1"/>
-          </p:cNvSpPr>
-          <p:nvPr>
-            <p:ph type="body" sz="quarter" idx="11"/>
-          </p:nvPr>
-        </p:nvSpPr>
-        <p:spPr>
-          <a:xfrm>
-            <a:off x="8801493" y="5547623"/>
-            <a:ext cx="3322638" cy="904824"/>
-          </a:xfrm>
-        </p:spPr>
-        <p:txBody>
-          <a:bodyPr/>
-          <a:lstStyle/>
-          <a:p>
-            <a:endParaRPr lang="en-US" dirty="0"/>
-          </a:p>
-        </p:txBody>
-      </p:sp>
-      <p:pic>
-        <p:nvPicPr>
-          <p:cNvPr id="5" name="Picture Placeholder 4" descr="A white box with green and white text&#10;&#10;Description automatically generated">
-            <a:extLst>
-              <a:ext uri="{FF2B5EF4-FFF2-40B4-BE49-F238E27FC236}">
-                <a16:creationId xmlns:a16="http://schemas.microsoft.com/office/drawing/2014/main" id="{57011ADA-E505-9929-FC52-3CA2113CB4CA}"/>
-              </a:ext>
-            </a:extLst>
-          </p:cNvPr>
-          <p:cNvPicPr>
-            <a:picLocks noGrp="1" noChangeAspect="1"/>
-          </p:cNvPicPr>
-          <p:nvPr>
-            <p:ph type="pic" sz="quarter" idx="10"/>
-          </p:nvPr>
-        </p:nvPicPr>
-        <p:blipFill>
-          <a:blip r:embed="rId4"/>
-          <a:stretch>
-            <a:fillRect/>
-          </a:stretch>
-        </p:blipFill>
-        <p:spPr>
-          <a:xfrm>
-            <a:off x="4850447" y="244301"/>
-            <a:ext cx="1627238" cy="2005840"/>
-          </a:xfrm>
-          <a:prstGeom prst="rect">
-            <a:avLst/>
-          </a:prstGeom>
-          <a:ln>
-            <a:noFill/>
-          </a:ln>
-          <a:effectLst>
-            <a:softEdge rad="112500"/>
-          </a:effectLst>
-        </p:spPr>
-      </p:pic>
-      <p:pic>
-        <p:nvPicPr>
-          <p:cNvPr id="6" name="Picture 5">
-            <a:extLst>
-              <a:ext uri="{FF2B5EF4-FFF2-40B4-BE49-F238E27FC236}">
-                <a16:creationId xmlns:a16="http://schemas.microsoft.com/office/drawing/2014/main" id="{31D9A30F-7C62-08F0-1D61-6C98711B41A5}"/>
-              </a:ext>
-            </a:extLst>
-          </p:cNvPr>
-          <p:cNvPicPr>
-            <a:picLocks noChangeAspect="1"/>
-          </p:cNvPicPr>
-          <p:nvPr/>
-        </p:nvPicPr>
-        <p:blipFill>
-          <a:blip r:embed="rId5"/>
-          <a:stretch>
-            <a:fillRect/>
-          </a:stretch>
-        </p:blipFill>
-        <p:spPr>
-          <a:xfrm>
-            <a:off x="8975282" y="5690267"/>
-            <a:ext cx="2975059" cy="619535"/>
-          </a:xfrm>
-          <a:prstGeom prst="rect">
-            <a:avLst/>
-          </a:prstGeom>
-          <a:ln>
-            <a:noFill/>
-          </a:ln>
-          <a:effectLst>
-            <a:outerShdw blurRad="292100" dist="139700" dir="2700000" algn="tl" rotWithShape="0">
-              <a:srgbClr val="333333">
-                <a:alpha val="65000"/>
-              </a:srgbClr>
-            </a:outerShdw>
-          </a:effectLst>
-        </p:spPr>
-      </p:pic>
-      <p:sp>
-        <p:nvSpPr>
           <p:cNvPr id="8" name="TextBox 7">
             <a:extLst>
               <a:ext uri="{FF2B5EF4-FFF2-40B4-BE49-F238E27FC236}">
@@ -20241,7 +20165,7 @@
             </a:r>
             <a:r>
               <a:rPr lang="en-US" sz="2000" dirty="0">
-                <a:hlinkClick r:id="rId6"/>
+                <a:hlinkClick r:id="rId5"/>
               </a:rPr>
               <a:t>https://github.com/yasenstar/learn_octave/tree/main/CodingMath</a:t>
             </a:r>
@@ -20293,7 +20217,7 @@
             <a:pPr algn="ctr"/>
             <a:r>
               <a:rPr lang="en-US" sz="6600" dirty="0"/>
-              <a:t>009</a:t>
+              <a:t>008</a:t>
             </a:r>
           </a:p>
         </p:txBody>
@@ -20406,14 +20330,14 @@
                 <a:latin typeface="Arial" panose="020B0604020202020204" pitchFamily="34" charset="0"/>
                 <a:cs typeface="Arial" panose="020B0604020202020204" pitchFamily="34" charset="0"/>
               </a:rPr>
-              <a:t>3. </a:t>
+              <a:t>2. </a:t>
             </a:r>
             <a:r>
               <a:rPr lang="zh-CN" altLang="en-US" sz="4000" dirty="0">
                 <a:latin typeface="Arial" panose="020B0604020202020204" pitchFamily="34" charset="0"/>
                 <a:cs typeface="Arial" panose="020B0604020202020204" pitchFamily="34" charset="0"/>
               </a:rPr>
-              <a:t>旅行商问题</a:t>
+              <a:t>消防所选址问题</a:t>
             </a:r>
             <a:endParaRPr lang="en-US" altLang="zh-CN" sz="4000" dirty="0">
               <a:latin typeface="Arial" panose="020B0604020202020204" pitchFamily="34" charset="0"/>
@@ -20422,52 +20346,52 @@
           </a:p>
           <a:p>
             <a:r>
-              <a:rPr lang="en-US" sz="2800" dirty="0">
+              <a:rPr lang="en-US" sz="4000" dirty="0">
                 <a:latin typeface="Arial" panose="020B0604020202020204" pitchFamily="34" charset="0"/>
                 <a:cs typeface="Arial" panose="020B0604020202020204" pitchFamily="34" charset="0"/>
               </a:rPr>
-              <a:t>3.1 </a:t>
-            </a:r>
-            <a:r>
-              <a:rPr lang="zh-CN" altLang="en-US" sz="2800" dirty="0">
+              <a:t>2.2 </a:t>
+            </a:r>
+            <a:r>
+              <a:rPr lang="zh-CN" altLang="en-US" sz="4000" dirty="0">
                 <a:latin typeface="Arial" panose="020B0604020202020204" pitchFamily="34" charset="0"/>
                 <a:cs typeface="Arial" panose="020B0604020202020204" pitchFamily="34" charset="0"/>
               </a:rPr>
-              <a:t>什么是旅行商问题</a:t>
-            </a:r>
-            <a:endParaRPr lang="en-US" altLang="zh-CN" sz="2800" dirty="0">
+              <a:t>用</a:t>
+            </a:r>
+            <a:r>
+              <a:rPr lang="en-US" altLang="zh-CN" sz="4000" dirty="0">
+                <a:latin typeface="Arial" panose="020B0604020202020204" pitchFamily="34" charset="0"/>
+                <a:cs typeface="Arial" panose="020B0604020202020204" pitchFamily="34" charset="0"/>
+              </a:rPr>
+              <a:t>Octave</a:t>
+            </a:r>
+            <a:r>
+              <a:rPr lang="zh-CN" altLang="en-US" sz="4000" dirty="0">
+                <a:latin typeface="Arial" panose="020B0604020202020204" pitchFamily="34" charset="0"/>
+                <a:cs typeface="Arial" panose="020B0604020202020204" pitchFamily="34" charset="0"/>
+              </a:rPr>
+              <a:t>解题</a:t>
+            </a:r>
+            <a:endParaRPr lang="en-US" altLang="zh-CN" sz="4000" dirty="0">
               <a:latin typeface="Arial" panose="020B0604020202020204" pitchFamily="34" charset="0"/>
               <a:cs typeface="Arial" panose="020B0604020202020204" pitchFamily="34" charset="0"/>
             </a:endParaRPr>
           </a:p>
           <a:p>
             <a:r>
-              <a:rPr lang="en-US" sz="2800" dirty="0">
+              <a:rPr lang="en-US" sz="3600" dirty="0">
                 <a:latin typeface="Arial" panose="020B0604020202020204" pitchFamily="34" charset="0"/>
                 <a:cs typeface="Arial" panose="020B0604020202020204" pitchFamily="34" charset="0"/>
               </a:rPr>
-              <a:t>3.2.1 </a:t>
-            </a:r>
-            <a:r>
-              <a:rPr lang="zh-CN" altLang="en-US" sz="2800" dirty="0">
+              <a:t>2.2.5 </a:t>
+            </a:r>
+            <a:r>
+              <a:rPr lang="zh-CN" altLang="en-US" sz="3600" dirty="0">
                 <a:latin typeface="Arial" panose="020B0604020202020204" pitchFamily="34" charset="0"/>
                 <a:cs typeface="Arial" panose="020B0604020202020204" pitchFamily="34" charset="0"/>
               </a:rPr>
-              <a:t>本章中使用的</a:t>
-            </a:r>
-            <a:r>
-              <a:rPr lang="en-US" sz="2800" dirty="0">
-                <a:latin typeface="Arial" panose="020B0604020202020204" pitchFamily="34" charset="0"/>
-                <a:cs typeface="Arial" panose="020B0604020202020204" pitchFamily="34" charset="0"/>
-              </a:rPr>
-              <a:t>Octave</a:t>
-            </a:r>
-            <a:r>
-              <a:rPr lang="zh-CN" altLang="en-US" sz="2800" dirty="0">
-                <a:latin typeface="Arial" panose="020B0604020202020204" pitchFamily="34" charset="0"/>
-                <a:cs typeface="Arial" panose="020B0604020202020204" pitchFamily="34" charset="0"/>
-              </a:rPr>
-              <a:t>的语句</a:t>
+              <a:t>寻找消防所的最佳位置</a:t>
             </a:r>
             <a:endParaRPr lang="en-US" sz="5400" dirty="0">
               <a:latin typeface="Arial" panose="020B0604020202020204" pitchFamily="34" charset="0"/>
@@ -20482,6 +20406,36 @@
             <a:extLst>
               <a:ext uri="{FF2B5EF4-FFF2-40B4-BE49-F238E27FC236}">
                 <a16:creationId xmlns:a16="http://schemas.microsoft.com/office/drawing/2014/main" id="{16FFAF40-C7C3-81F4-64CA-AB1B6B9B27C1}"/>
+              </a:ext>
+            </a:extLst>
+          </p:cNvPr>
+          <p:cNvPicPr>
+            <a:picLocks noChangeAspect="1"/>
+          </p:cNvPicPr>
+          <p:nvPr/>
+        </p:nvPicPr>
+        <p:blipFill>
+          <a:blip r:embed="rId6"/>
+          <a:stretch>
+            <a:fillRect/>
+          </a:stretch>
+        </p:blipFill>
+        <p:spPr>
+          <a:xfrm>
+            <a:off x="9029070" y="423768"/>
+            <a:ext cx="2714625" cy="666750"/>
+          </a:xfrm>
+          <a:prstGeom prst="rect">
+            <a:avLst/>
+          </a:prstGeom>
+        </p:spPr>
+      </p:pic>
+      <p:pic>
+        <p:nvPicPr>
+          <p:cNvPr id="4" name="Picture 3">
+            <a:extLst>
+              <a:ext uri="{FF2B5EF4-FFF2-40B4-BE49-F238E27FC236}">
+                <a16:creationId xmlns:a16="http://schemas.microsoft.com/office/drawing/2014/main" id="{11A86784-04E5-4894-6D01-CDE8EDC34C0D}"/>
               </a:ext>
             </a:extLst>
           </p:cNvPr>
@@ -20498,45 +20452,8 @@
         </p:blipFill>
         <p:spPr>
           <a:xfrm>
-            <a:off x="9029070" y="423768"/>
-            <a:ext cx="2714625" cy="666750"/>
-          </a:xfrm>
-          <a:prstGeom prst="rect">
-            <a:avLst/>
-          </a:prstGeom>
-        </p:spPr>
-      </p:pic>
-      <p:pic>
-        <p:nvPicPr>
-          <p:cNvPr id="1026" name="Picture 2" descr="旅行商问题_360百科">
-            <a:extLst>
-              <a:ext uri="{FF2B5EF4-FFF2-40B4-BE49-F238E27FC236}">
-                <a16:creationId xmlns:a16="http://schemas.microsoft.com/office/drawing/2014/main" id="{10CE35EB-6DAC-A847-2E86-B2F68B8FA9FC}"/>
-              </a:ext>
-            </a:extLst>
-          </p:cNvPr>
-          <p:cNvPicPr>
-            <a:picLocks noChangeAspect="1" noChangeArrowheads="1"/>
-          </p:cNvPicPr>
-          <p:nvPr/>
-        </p:nvPicPr>
-        <p:blipFill>
-          <a:blip r:embed="rId8">
-            <a:extLst>
-              <a:ext uri="{28A0092B-C50C-407E-A947-70E740481C1C}">
-                <a14:useLocalDpi xmlns:a14="http://schemas.microsoft.com/office/drawing/2010/main" val="0"/>
-              </a:ext>
-            </a:extLst>
-          </a:blip>
-          <a:srcRect/>
-          <a:stretch>
-            <a:fillRect/>
-          </a:stretch>
-        </p:blipFill>
-        <p:spPr bwMode="auto">
-          <a:xfrm>
-            <a:off x="10358613" y="1604683"/>
-            <a:ext cx="1651961" cy="1719263"/>
+            <a:off x="6477685" y="2227729"/>
+            <a:ext cx="5540119" cy="2658158"/>
           </a:xfrm>
           <a:prstGeom prst="rect">
             <a:avLst/>
@@ -20551,89 +20468,12 @@
               </a:srgbClr>
             </a:outerShdw>
           </a:effectLst>
-          <a:extLst>
-            <a:ext uri="{909E8E84-426E-40DD-AFC4-6F175D3DCCD1}">
-              <a14:hiddenFill xmlns:a14="http://schemas.microsoft.com/office/drawing/2010/main">
-                <a:solidFill>
-                  <a:srgbClr val="FFFFFF"/>
-                </a:solidFill>
-              </a14:hiddenFill>
-            </a:ext>
-          </a:extLst>
         </p:spPr>
       </p:pic>
-      <p:sp>
-        <p:nvSpPr>
-          <p:cNvPr id="12" name="TextBox 11">
-            <a:extLst>
-              <a:ext uri="{FF2B5EF4-FFF2-40B4-BE49-F238E27FC236}">
-                <a16:creationId xmlns:a16="http://schemas.microsoft.com/office/drawing/2014/main" id="{761EDE1E-8BFF-15C5-8889-C0BF61435E35}"/>
-              </a:ext>
-            </a:extLst>
-          </p:cNvPr>
-          <p:cNvSpPr txBox="1"/>
-          <p:nvPr/>
-        </p:nvSpPr>
-        <p:spPr>
-          <a:xfrm>
-            <a:off x="5835393" y="2218796"/>
-            <a:ext cx="4523220" cy="369332"/>
-          </a:xfrm>
-          <a:prstGeom prst="rect">
-            <a:avLst/>
-          </a:prstGeom>
-          <a:solidFill>
-            <a:schemeClr val="bg2"/>
-          </a:solidFill>
-        </p:spPr>
-        <p:txBody>
-          <a:bodyPr wrap="square">
-            <a:spAutoFit/>
-          </a:bodyPr>
-          <a:lstStyle/>
-          <a:p>
-            <a:r>
-              <a:rPr lang="en-US" b="0" i="0" dirty="0">
-                <a:solidFill>
-                  <a:schemeClr val="accent3"/>
-                </a:solidFill>
-                <a:effectLst/>
-                <a:latin typeface="Arial" panose="020B0604020202020204" pitchFamily="34" charset="0"/>
-              </a:rPr>
-              <a:t>Travelling salesman problem，</a:t>
-            </a:r>
-            <a:r>
-              <a:rPr lang="zh-CN" altLang="en-US" b="0" i="0" dirty="0">
-                <a:solidFill>
-                  <a:schemeClr val="accent3"/>
-                </a:solidFill>
-                <a:effectLst/>
-                <a:latin typeface="Arial" panose="020B0604020202020204" pitchFamily="34" charset="0"/>
-              </a:rPr>
-              <a:t>缩写：</a:t>
-            </a:r>
-            <a:r>
-              <a:rPr lang="en-US" b="1" i="0" dirty="0">
-                <a:solidFill>
-                  <a:schemeClr val="accent3"/>
-                </a:solidFill>
-                <a:effectLst/>
-                <a:latin typeface="Arial" panose="020B0604020202020204" pitchFamily="34" charset="0"/>
-              </a:rPr>
-              <a:t>TSP</a:t>
-            </a:r>
-            <a:endParaRPr lang="en-US" dirty="0">
-              <a:solidFill>
-                <a:schemeClr val="accent3"/>
-              </a:solidFill>
-            </a:endParaRPr>
-          </a:p>
-        </p:txBody>
-      </p:sp>
     </p:spTree>
     <p:extLst>
       <p:ext uri="{BB962C8B-B14F-4D97-AF65-F5344CB8AC3E}">
-        <p14:creationId xmlns:p14="http://schemas.microsoft.com/office/powerpoint/2010/main" val="4005279571"/>
+        <p14:creationId xmlns:p14="http://schemas.microsoft.com/office/powerpoint/2010/main" val="3968597846"/>
       </p:ext>
     </p:extLst>
   </p:cSld>
@@ -20660,92 +20500,19 @@
           <a:chExt cx="0" cy="0"/>
         </a:xfrm>
       </p:grpSpPr>
-      <p:sp>
-        <p:nvSpPr>
-          <p:cNvPr id="17" name="Title 16">
-            <a:extLst>
-              <a:ext uri="{FF2B5EF4-FFF2-40B4-BE49-F238E27FC236}">
-                <a16:creationId xmlns:a16="http://schemas.microsoft.com/office/drawing/2014/main" id="{2A7A4DC1-E50C-440F-5AAD-B8FF3E74FA45}"/>
-              </a:ext>
-            </a:extLst>
-          </p:cNvPr>
-          <p:cNvSpPr>
-            <a:spLocks noGrp="1"/>
-          </p:cNvSpPr>
-          <p:nvPr>
-            <p:ph type="title"/>
-          </p:nvPr>
-        </p:nvSpPr>
-        <p:spPr>
-          <a:xfrm>
-            <a:off x="241659" y="335415"/>
-            <a:ext cx="5151698" cy="2219250"/>
-          </a:xfrm>
-        </p:spPr>
-        <p:txBody>
-          <a:bodyPr/>
-          <a:lstStyle/>
-          <a:p>
-            <a:r>
-              <a:rPr lang="zh-CN" altLang="en-US" sz="5400" dirty="0"/>
-              <a:t>编程数学</a:t>
-            </a:r>
-            <a:br>
-              <a:rPr lang="en-US" altLang="zh-CN" sz="5400" dirty="0"/>
-            </a:br>
-            <a:r>
-              <a:rPr lang="en-US" altLang="zh-CN" sz="3200" dirty="0"/>
-              <a:t>Using Octave for Coding Mathematics</a:t>
-            </a:r>
-            <a:endParaRPr lang="en-US" sz="5400" dirty="0"/>
-          </a:p>
-        </p:txBody>
-      </p:sp>
-      <p:sp>
-        <p:nvSpPr>
-          <p:cNvPr id="18" name="Text Placeholder 17">
-            <a:extLst>
-              <a:ext uri="{FF2B5EF4-FFF2-40B4-BE49-F238E27FC236}">
-                <a16:creationId xmlns:a16="http://schemas.microsoft.com/office/drawing/2014/main" id="{D62CC159-4789-0E92-08AE-ECCAB12B677E}"/>
-              </a:ext>
-            </a:extLst>
-          </p:cNvPr>
-          <p:cNvSpPr>
-            <a:spLocks noGrp="1"/>
-          </p:cNvSpPr>
-          <p:nvPr>
-            <p:ph type="body" sz="quarter" idx="11"/>
-          </p:nvPr>
-        </p:nvSpPr>
-        <p:spPr>
-          <a:xfrm>
-            <a:off x="8801493" y="5547623"/>
-            <a:ext cx="3322638" cy="904824"/>
-          </a:xfrm>
-        </p:spPr>
-        <p:txBody>
-          <a:bodyPr/>
-          <a:lstStyle/>
-          <a:p>
-            <a:endParaRPr lang="en-US" dirty="0"/>
-          </a:p>
-        </p:txBody>
-      </p:sp>
       <p:pic>
         <p:nvPicPr>
-          <p:cNvPr id="5" name="Picture Placeholder 4" descr="A white box with green and white text&#10;&#10;Description automatically generated">
-            <a:extLst>
-              <a:ext uri="{FF2B5EF4-FFF2-40B4-BE49-F238E27FC236}">
-                <a16:creationId xmlns:a16="http://schemas.microsoft.com/office/drawing/2014/main" id="{57011ADA-E505-9929-FC52-3CA2113CB4CA}"/>
+          <p:cNvPr id="4" name="Picture 3">
+            <a:extLst>
+              <a:ext uri="{FF2B5EF4-FFF2-40B4-BE49-F238E27FC236}">
+                <a16:creationId xmlns:a16="http://schemas.microsoft.com/office/drawing/2014/main" id="{331C33D3-5A73-2E43-87EF-68E8D472DFC8}"/>
               </a:ext>
             </a:extLst>
           </p:cNvPr>
           <p:cNvPicPr>
-            <a:picLocks noGrp="1" noChangeAspect="1"/>
+            <a:picLocks noChangeAspect="1"/>
           </p:cNvPicPr>
-          <p:nvPr>
-            <p:ph type="pic" sz="quarter" idx="10"/>
-          </p:nvPr>
+          <p:nvPr/>
         </p:nvPicPr>
         <p:blipFill>
           <a:blip r:embed="rId3"/>
@@ -20755,44 +20522,8 @@
         </p:blipFill>
         <p:spPr>
           <a:xfrm>
-            <a:off x="4850447" y="244301"/>
-            <a:ext cx="1627238" cy="2005840"/>
-          </a:xfrm>
-          <a:prstGeom prst="rect">
-            <a:avLst/>
-          </a:prstGeom>
-          <a:ln>
-            <a:noFill/>
-          </a:ln>
-          <a:effectLst>
-            <a:softEdge rad="112500"/>
-          </a:effectLst>
-        </p:spPr>
-      </p:pic>
-      <p:pic>
-        <p:nvPicPr>
-          <p:cNvPr id="6" name="Picture 5">
-            <a:extLst>
-              <a:ext uri="{FF2B5EF4-FFF2-40B4-BE49-F238E27FC236}">
-                <a16:creationId xmlns:a16="http://schemas.microsoft.com/office/drawing/2014/main" id="{31D9A30F-7C62-08F0-1D61-6C98711B41A5}"/>
-              </a:ext>
-            </a:extLst>
-          </p:cNvPr>
-          <p:cNvPicPr>
-            <a:picLocks noChangeAspect="1"/>
-          </p:cNvPicPr>
-          <p:nvPr/>
-        </p:nvPicPr>
-        <p:blipFill>
-          <a:blip r:embed="rId4"/>
-          <a:stretch>
-            <a:fillRect/>
-          </a:stretch>
-        </p:blipFill>
-        <p:spPr>
-          <a:xfrm>
-            <a:off x="8975282" y="5690267"/>
-            <a:ext cx="2975059" cy="619535"/>
+            <a:off x="5981070" y="2632448"/>
+            <a:ext cx="6095999" cy="2720858"/>
           </a:xfrm>
           <a:prstGeom prst="rect">
             <a:avLst/>
@@ -20811,6 +20542,155 @@
       </p:pic>
       <p:sp>
         <p:nvSpPr>
+          <p:cNvPr id="17" name="Title 16">
+            <a:extLst>
+              <a:ext uri="{FF2B5EF4-FFF2-40B4-BE49-F238E27FC236}">
+                <a16:creationId xmlns:a16="http://schemas.microsoft.com/office/drawing/2014/main" id="{2A7A4DC1-E50C-440F-5AAD-B8FF3E74FA45}"/>
+              </a:ext>
+            </a:extLst>
+          </p:cNvPr>
+          <p:cNvSpPr>
+            <a:spLocks noGrp="1"/>
+          </p:cNvSpPr>
+          <p:nvPr>
+            <p:ph type="title"/>
+          </p:nvPr>
+        </p:nvSpPr>
+        <p:spPr>
+          <a:xfrm>
+            <a:off x="241659" y="335415"/>
+            <a:ext cx="5151698" cy="2219250"/>
+          </a:xfrm>
+        </p:spPr>
+        <p:txBody>
+          <a:bodyPr/>
+          <a:lstStyle/>
+          <a:p>
+            <a:r>
+              <a:rPr lang="zh-CN" altLang="en-US" sz="5400" dirty="0"/>
+              <a:t>编程数学</a:t>
+            </a:r>
+            <a:br>
+              <a:rPr lang="en-US" altLang="zh-CN" sz="5400" dirty="0"/>
+            </a:br>
+            <a:r>
+              <a:rPr lang="en-US" altLang="zh-CN" sz="3200" dirty="0"/>
+              <a:t>Using Octave for Coding Mathematics</a:t>
+            </a:r>
+            <a:endParaRPr lang="en-US" sz="5400" dirty="0"/>
+          </a:p>
+        </p:txBody>
+      </p:sp>
+      <p:sp>
+        <p:nvSpPr>
+          <p:cNvPr id="18" name="Text Placeholder 17">
+            <a:extLst>
+              <a:ext uri="{FF2B5EF4-FFF2-40B4-BE49-F238E27FC236}">
+                <a16:creationId xmlns:a16="http://schemas.microsoft.com/office/drawing/2014/main" id="{D62CC159-4789-0E92-08AE-ECCAB12B677E}"/>
+              </a:ext>
+            </a:extLst>
+          </p:cNvPr>
+          <p:cNvSpPr>
+            <a:spLocks noGrp="1"/>
+          </p:cNvSpPr>
+          <p:nvPr>
+            <p:ph type="body" sz="quarter" idx="11"/>
+          </p:nvPr>
+        </p:nvSpPr>
+        <p:spPr>
+          <a:xfrm>
+            <a:off x="8801493" y="5547623"/>
+            <a:ext cx="3322638" cy="904824"/>
+          </a:xfrm>
+        </p:spPr>
+        <p:txBody>
+          <a:bodyPr/>
+          <a:lstStyle/>
+          <a:p>
+            <a:endParaRPr lang="en-US" dirty="0"/>
+          </a:p>
+        </p:txBody>
+      </p:sp>
+      <p:pic>
+        <p:nvPicPr>
+          <p:cNvPr id="5" name="Picture Placeholder 4" descr="A white box with green and white text&#10;&#10;Description automatically generated">
+            <a:extLst>
+              <a:ext uri="{FF2B5EF4-FFF2-40B4-BE49-F238E27FC236}">
+                <a16:creationId xmlns:a16="http://schemas.microsoft.com/office/drawing/2014/main" id="{57011ADA-E505-9929-FC52-3CA2113CB4CA}"/>
+              </a:ext>
+            </a:extLst>
+          </p:cNvPr>
+          <p:cNvPicPr>
+            <a:picLocks noGrp="1" noChangeAspect="1"/>
+          </p:cNvPicPr>
+          <p:nvPr>
+            <p:ph type="pic" sz="quarter" idx="10"/>
+          </p:nvPr>
+        </p:nvPicPr>
+        <p:blipFill>
+          <a:blip r:embed="rId4"/>
+          <a:stretch>
+            <a:fillRect/>
+          </a:stretch>
+        </p:blipFill>
+        <p:spPr>
+          <a:xfrm>
+            <a:off x="4850447" y="244301"/>
+            <a:ext cx="1627238" cy="2005840"/>
+          </a:xfrm>
+          <a:prstGeom prst="rect">
+            <a:avLst/>
+          </a:prstGeom>
+          <a:ln>
+            <a:noFill/>
+          </a:ln>
+          <a:effectLst>
+            <a:softEdge rad="112500"/>
+          </a:effectLst>
+        </p:spPr>
+      </p:pic>
+      <p:pic>
+        <p:nvPicPr>
+          <p:cNvPr id="6" name="Picture 5">
+            <a:extLst>
+              <a:ext uri="{FF2B5EF4-FFF2-40B4-BE49-F238E27FC236}">
+                <a16:creationId xmlns:a16="http://schemas.microsoft.com/office/drawing/2014/main" id="{31D9A30F-7C62-08F0-1D61-6C98711B41A5}"/>
+              </a:ext>
+            </a:extLst>
+          </p:cNvPr>
+          <p:cNvPicPr>
+            <a:picLocks noChangeAspect="1"/>
+          </p:cNvPicPr>
+          <p:nvPr/>
+        </p:nvPicPr>
+        <p:blipFill>
+          <a:blip r:embed="rId5"/>
+          <a:stretch>
+            <a:fillRect/>
+          </a:stretch>
+        </p:blipFill>
+        <p:spPr>
+          <a:xfrm>
+            <a:off x="8975282" y="5690267"/>
+            <a:ext cx="2975059" cy="619535"/>
+          </a:xfrm>
+          <a:prstGeom prst="rect">
+            <a:avLst/>
+          </a:prstGeom>
+          <a:ln>
+            <a:noFill/>
+          </a:ln>
+          <a:effectLst>
+            <a:outerShdw blurRad="292100" dist="139700" dir="2700000" algn="tl" rotWithShape="0">
+              <a:srgbClr val="333333">
+                <a:alpha val="65000"/>
+              </a:srgbClr>
+            </a:outerShdw>
+          </a:effectLst>
+        </p:spPr>
+      </p:pic>
+      <p:sp>
+        <p:nvSpPr>
           <p:cNvPr id="8" name="TextBox 7">
             <a:extLst>
               <a:ext uri="{FF2B5EF4-FFF2-40B4-BE49-F238E27FC236}">
@@ -20845,7 +20725,7 @@
             </a:r>
             <a:r>
               <a:rPr lang="en-US" sz="2000" dirty="0">
-                <a:hlinkClick r:id="rId5"/>
+                <a:hlinkClick r:id="rId6"/>
               </a:rPr>
               <a:t>https://github.com/yasenstar/learn_octave/tree/main/CodingMath</a:t>
             </a:r>
@@ -20897,7 +20777,7 @@
             <a:pPr algn="ctr"/>
             <a:r>
               <a:rPr lang="en-US" sz="6600" dirty="0"/>
-              <a:t>010</a:t>
+              <a:t>009</a:t>
             </a:r>
           </a:p>
         </p:txBody>
@@ -21026,40 +20906,54 @@
           </a:p>
           <a:p>
             <a:r>
-              <a:rPr lang="en-US" sz="3600" dirty="0">
+              <a:rPr lang="en-US" sz="2800" dirty="0">
                 <a:latin typeface="Arial" panose="020B0604020202020204" pitchFamily="34" charset="0"/>
                 <a:cs typeface="Arial" panose="020B0604020202020204" pitchFamily="34" charset="0"/>
               </a:rPr>
-              <a:t>3.2.2 </a:t>
-            </a:r>
-            <a:r>
-              <a:rPr lang="zh-CN" altLang="en-US" sz="3600" dirty="0">
+              <a:t>3.1 </a:t>
+            </a:r>
+            <a:r>
+              <a:rPr lang="zh-CN" altLang="en-US" sz="2800" dirty="0">
                 <a:latin typeface="Arial" panose="020B0604020202020204" pitchFamily="34" charset="0"/>
                 <a:cs typeface="Arial" panose="020B0604020202020204" pitchFamily="34" charset="0"/>
               </a:rPr>
-              <a:t>寻找快速配送路径</a:t>
-            </a:r>
-            <a:endParaRPr lang="en-US" altLang="zh-CN" sz="3600" dirty="0">
+              <a:t>什么是旅行商问题</a:t>
+            </a:r>
+            <a:endParaRPr lang="en-US" altLang="zh-CN" sz="2800" dirty="0">
               <a:latin typeface="Arial" panose="020B0604020202020204" pitchFamily="34" charset="0"/>
               <a:cs typeface="Arial" panose="020B0604020202020204" pitchFamily="34" charset="0"/>
             </a:endParaRPr>
           </a:p>
           <a:p>
             <a:r>
-              <a:rPr lang="en-US" sz="3600" dirty="0">
+              <a:rPr lang="en-US" sz="2800" dirty="0">
                 <a:latin typeface="Arial" panose="020B0604020202020204" pitchFamily="34" charset="0"/>
                 <a:cs typeface="Arial" panose="020B0604020202020204" pitchFamily="34" charset="0"/>
               </a:rPr>
-              <a:t>3.2.3 </a:t>
-            </a:r>
-            <a:r>
-              <a:rPr lang="zh-CN" altLang="en-US" sz="3600" dirty="0">
+              <a:t>3.2.1 </a:t>
+            </a:r>
+            <a:r>
+              <a:rPr lang="zh-CN" altLang="en-US" sz="2800" dirty="0">
                 <a:latin typeface="Arial" panose="020B0604020202020204" pitchFamily="34" charset="0"/>
                 <a:cs typeface="Arial" panose="020B0604020202020204" pitchFamily="34" charset="0"/>
               </a:rPr>
-              <a:t>最近处邻居算法</a:t>
-            </a:r>
-            <a:endParaRPr lang="en-US" sz="6600" dirty="0">
+              <a:t>本章中使用的</a:t>
+            </a:r>
+            <a:r>
+              <a:rPr lang="en-US" sz="2800" dirty="0">
+                <a:latin typeface="Arial" panose="020B0604020202020204" pitchFamily="34" charset="0"/>
+                <a:cs typeface="Arial" panose="020B0604020202020204" pitchFamily="34" charset="0"/>
+              </a:rPr>
+              <a:t>Octave</a:t>
+            </a:r>
+            <a:r>
+              <a:rPr lang="zh-CN" altLang="en-US" sz="2800" dirty="0">
+                <a:latin typeface="Arial" panose="020B0604020202020204" pitchFamily="34" charset="0"/>
+                <a:cs typeface="Arial" panose="020B0604020202020204" pitchFamily="34" charset="0"/>
+              </a:rPr>
+              <a:t>的语句</a:t>
+            </a:r>
+            <a:endParaRPr lang="en-US" sz="5400" dirty="0">
               <a:latin typeface="Arial" panose="020B0604020202020204" pitchFamily="34" charset="0"/>
               <a:cs typeface="Arial" panose="020B0604020202020204" pitchFamily="34" charset="0"/>
             </a:endParaRPr>
@@ -21072,36 +20966,6 @@
             <a:extLst>
               <a:ext uri="{FF2B5EF4-FFF2-40B4-BE49-F238E27FC236}">
                 <a16:creationId xmlns:a16="http://schemas.microsoft.com/office/drawing/2014/main" id="{16FFAF40-C7C3-81F4-64CA-AB1B6B9B27C1}"/>
-              </a:ext>
-            </a:extLst>
-          </p:cNvPr>
-          <p:cNvPicPr>
-            <a:picLocks noChangeAspect="1"/>
-          </p:cNvPicPr>
-          <p:nvPr/>
-        </p:nvPicPr>
-        <p:blipFill>
-          <a:blip r:embed="rId6"/>
-          <a:stretch>
-            <a:fillRect/>
-          </a:stretch>
-        </p:blipFill>
-        <p:spPr>
-          <a:xfrm>
-            <a:off x="9029070" y="423768"/>
-            <a:ext cx="2714625" cy="666750"/>
-          </a:xfrm>
-          <a:prstGeom prst="rect">
-            <a:avLst/>
-          </a:prstGeom>
-        </p:spPr>
-      </p:pic>
-      <p:pic>
-        <p:nvPicPr>
-          <p:cNvPr id="13" name="Picture 12">
-            <a:extLst>
-              <a:ext uri="{FF2B5EF4-FFF2-40B4-BE49-F238E27FC236}">
-                <a16:creationId xmlns:a16="http://schemas.microsoft.com/office/drawing/2014/main" id="{B9C86A5A-BFBC-4D41-EDEE-61CD569E51F3}"/>
               </a:ext>
             </a:extLst>
           </p:cNvPr>
@@ -21118,8 +20982,45 @@
         </p:blipFill>
         <p:spPr>
           <a:xfrm>
-            <a:off x="5756489" y="2277163"/>
-            <a:ext cx="6265182" cy="3127815"/>
+            <a:off x="9029070" y="423768"/>
+            <a:ext cx="2714625" cy="666750"/>
+          </a:xfrm>
+          <a:prstGeom prst="rect">
+            <a:avLst/>
+          </a:prstGeom>
+        </p:spPr>
+      </p:pic>
+      <p:pic>
+        <p:nvPicPr>
+          <p:cNvPr id="1026" name="Picture 2" descr="旅行商问题_360百科">
+            <a:extLst>
+              <a:ext uri="{FF2B5EF4-FFF2-40B4-BE49-F238E27FC236}">
+                <a16:creationId xmlns:a16="http://schemas.microsoft.com/office/drawing/2014/main" id="{10CE35EB-6DAC-A847-2E86-B2F68B8FA9FC}"/>
+              </a:ext>
+            </a:extLst>
+          </p:cNvPr>
+          <p:cNvPicPr>
+            <a:picLocks noChangeAspect="1" noChangeArrowheads="1"/>
+          </p:cNvPicPr>
+          <p:nvPr/>
+        </p:nvPicPr>
+        <p:blipFill>
+          <a:blip r:embed="rId8">
+            <a:extLst>
+              <a:ext uri="{28A0092B-C50C-407E-A947-70E740481C1C}">
+                <a14:useLocalDpi xmlns:a14="http://schemas.microsoft.com/office/drawing/2010/main" val="0"/>
+              </a:ext>
+            </a:extLst>
+          </a:blip>
+          <a:srcRect/>
+          <a:stretch>
+            <a:fillRect/>
+          </a:stretch>
+        </p:blipFill>
+        <p:spPr bwMode="auto">
+          <a:xfrm>
+            <a:off x="10358613" y="1604683"/>
+            <a:ext cx="1651961" cy="1719263"/>
           </a:xfrm>
           <a:prstGeom prst="rect">
             <a:avLst/>
@@ -21134,12 +21035,89 @@
               </a:srgbClr>
             </a:outerShdw>
           </a:effectLst>
+          <a:extLst>
+            <a:ext uri="{909E8E84-426E-40DD-AFC4-6F175D3DCCD1}">
+              <a14:hiddenFill xmlns:a14="http://schemas.microsoft.com/office/drawing/2010/main">
+                <a:solidFill>
+                  <a:srgbClr val="FFFFFF"/>
+                </a:solidFill>
+              </a14:hiddenFill>
+            </a:ext>
+          </a:extLst>
         </p:spPr>
       </p:pic>
+      <p:sp>
+        <p:nvSpPr>
+          <p:cNvPr id="12" name="TextBox 11">
+            <a:extLst>
+              <a:ext uri="{FF2B5EF4-FFF2-40B4-BE49-F238E27FC236}">
+                <a16:creationId xmlns:a16="http://schemas.microsoft.com/office/drawing/2014/main" id="{761EDE1E-8BFF-15C5-8889-C0BF61435E35}"/>
+              </a:ext>
+            </a:extLst>
+          </p:cNvPr>
+          <p:cNvSpPr txBox="1"/>
+          <p:nvPr/>
+        </p:nvSpPr>
+        <p:spPr>
+          <a:xfrm>
+            <a:off x="5835393" y="2218796"/>
+            <a:ext cx="4523220" cy="369332"/>
+          </a:xfrm>
+          <a:prstGeom prst="rect">
+            <a:avLst/>
+          </a:prstGeom>
+          <a:solidFill>
+            <a:schemeClr val="bg2"/>
+          </a:solidFill>
+        </p:spPr>
+        <p:txBody>
+          <a:bodyPr wrap="square">
+            <a:spAutoFit/>
+          </a:bodyPr>
+          <a:lstStyle/>
+          <a:p>
+            <a:r>
+              <a:rPr lang="en-US" b="0" i="0" dirty="0">
+                <a:solidFill>
+                  <a:schemeClr val="accent3"/>
+                </a:solidFill>
+                <a:effectLst/>
+                <a:latin typeface="Arial" panose="020B0604020202020204" pitchFamily="34" charset="0"/>
+              </a:rPr>
+              <a:t>Travelling salesman problem，</a:t>
+            </a:r>
+            <a:r>
+              <a:rPr lang="zh-CN" altLang="en-US" b="0" i="0" dirty="0">
+                <a:solidFill>
+                  <a:schemeClr val="accent3"/>
+                </a:solidFill>
+                <a:effectLst/>
+                <a:latin typeface="Arial" panose="020B0604020202020204" pitchFamily="34" charset="0"/>
+              </a:rPr>
+              <a:t>缩写：</a:t>
+            </a:r>
+            <a:r>
+              <a:rPr lang="en-US" b="1" i="0" dirty="0">
+                <a:solidFill>
+                  <a:schemeClr val="accent3"/>
+                </a:solidFill>
+                <a:effectLst/>
+                <a:latin typeface="Arial" panose="020B0604020202020204" pitchFamily="34" charset="0"/>
+              </a:rPr>
+              <a:t>TSP</a:t>
+            </a:r>
+            <a:endParaRPr lang="en-US" dirty="0">
+              <a:solidFill>
+                <a:schemeClr val="accent3"/>
+              </a:solidFill>
+            </a:endParaRPr>
+          </a:p>
+        </p:txBody>
+      </p:sp>
     </p:spTree>
     <p:extLst>
       <p:ext uri="{BB962C8B-B14F-4D97-AF65-F5344CB8AC3E}">
-        <p14:creationId xmlns:p14="http://schemas.microsoft.com/office/powerpoint/2010/main" val="1155604665"/>
+        <p14:creationId xmlns:p14="http://schemas.microsoft.com/office/powerpoint/2010/main" val="4005279571"/>
       </p:ext>
     </p:extLst>
   </p:cSld>
@@ -21403,7 +21381,7 @@
             <a:pPr algn="ctr"/>
             <a:r>
               <a:rPr lang="en-US" sz="6600" dirty="0"/>
-              <a:t>011</a:t>
+              <a:t>010</a:t>
             </a:r>
           </a:p>
         </p:txBody>
@@ -21424,8 +21402,8 @@
         </p:nvSpPr>
         <p:spPr>
           <a:xfrm>
-            <a:off x="241659" y="3792071"/>
-            <a:ext cx="5059456" cy="1755552"/>
+            <a:off x="241658" y="3792071"/>
+            <a:ext cx="6362465" cy="1755552"/>
           </a:xfrm>
           <a:prstGeom prst="rect">
             <a:avLst/>
@@ -21536,14 +21514,34 @@
                 <a:latin typeface="Arial" panose="020B0604020202020204" pitchFamily="34" charset="0"/>
                 <a:cs typeface="Arial" panose="020B0604020202020204" pitchFamily="34" charset="0"/>
               </a:rPr>
-              <a:t>3.2.4 3.2.5 </a:t>
+              <a:t>3.2.2 </a:t>
             </a:r>
             <a:r>
               <a:rPr lang="zh-CN" altLang="en-US" sz="3600" dirty="0">
                 <a:latin typeface="Arial" panose="020B0604020202020204" pitchFamily="34" charset="0"/>
                 <a:cs typeface="Arial" panose="020B0604020202020204" pitchFamily="34" charset="0"/>
               </a:rPr>
-              <a:t>利用遗传算法寻找最优路径</a:t>
+              <a:t>寻找快速配送路径</a:t>
+            </a:r>
+            <a:endParaRPr lang="en-US" altLang="zh-CN" sz="3600" dirty="0">
+              <a:latin typeface="Arial" panose="020B0604020202020204" pitchFamily="34" charset="0"/>
+              <a:cs typeface="Arial" panose="020B0604020202020204" pitchFamily="34" charset="0"/>
+            </a:endParaRPr>
+          </a:p>
+          <a:p>
+            <a:r>
+              <a:rPr lang="en-US" sz="3600" dirty="0">
+                <a:latin typeface="Arial" panose="020B0604020202020204" pitchFamily="34" charset="0"/>
+                <a:cs typeface="Arial" panose="020B0604020202020204" pitchFamily="34" charset="0"/>
+              </a:rPr>
+              <a:t>3.2.3 </a:t>
+            </a:r>
+            <a:r>
+              <a:rPr lang="zh-CN" altLang="en-US" sz="3600" dirty="0">
+                <a:latin typeface="Arial" panose="020B0604020202020204" pitchFamily="34" charset="0"/>
+                <a:cs typeface="Arial" panose="020B0604020202020204" pitchFamily="34" charset="0"/>
+              </a:rPr>
+              <a:t>最近处邻居算法</a:t>
             </a:r>
             <a:endParaRPr lang="en-US" sz="6600" dirty="0">
               <a:latin typeface="Arial" panose="020B0604020202020204" pitchFamily="34" charset="0"/>
@@ -21584,10 +21582,10 @@
       </p:pic>
       <p:pic>
         <p:nvPicPr>
-          <p:cNvPr id="4" name="Picture 3">
-            <a:extLst>
-              <a:ext uri="{FF2B5EF4-FFF2-40B4-BE49-F238E27FC236}">
-                <a16:creationId xmlns:a16="http://schemas.microsoft.com/office/drawing/2014/main" id="{976E4E9A-BFBC-803B-64AF-E5E398099D8F}"/>
+          <p:cNvPr id="13" name="Picture 12">
+            <a:extLst>
+              <a:ext uri="{FF2B5EF4-FFF2-40B4-BE49-F238E27FC236}">
+                <a16:creationId xmlns:a16="http://schemas.microsoft.com/office/drawing/2014/main" id="{B9C86A5A-BFBC-4D41-EDEE-61CD569E51F3}"/>
               </a:ext>
             </a:extLst>
           </p:cNvPr>
@@ -21604,8 +21602,8 @@
         </p:blipFill>
         <p:spPr>
           <a:xfrm>
-            <a:off x="5301114" y="2246503"/>
-            <a:ext cx="6738486" cy="2961727"/>
+            <a:off x="5756489" y="2277163"/>
+            <a:ext cx="6265182" cy="3127815"/>
           </a:xfrm>
           <a:prstGeom prst="rect">
             <a:avLst/>
@@ -21625,7 +21623,7 @@
     </p:spTree>
     <p:extLst>
       <p:ext uri="{BB962C8B-B14F-4D97-AF65-F5344CB8AC3E}">
-        <p14:creationId xmlns:p14="http://schemas.microsoft.com/office/powerpoint/2010/main" val="1210053382"/>
+        <p14:creationId xmlns:p14="http://schemas.microsoft.com/office/powerpoint/2010/main" val="1155604665"/>
       </p:ext>
     </p:extLst>
   </p:cSld>
@@ -21889,7 +21887,7 @@
             <a:pPr algn="ctr"/>
             <a:r>
               <a:rPr lang="en-US" sz="6600" dirty="0"/>
-              <a:t>012</a:t>
+              <a:t>011</a:t>
             </a:r>
           </a:p>
         </p:txBody>
@@ -22002,14 +22000,14 @@
                 <a:latin typeface="Arial" panose="020B0604020202020204" pitchFamily="34" charset="0"/>
                 <a:cs typeface="Arial" panose="020B0604020202020204" pitchFamily="34" charset="0"/>
               </a:rPr>
-              <a:t>4. </a:t>
+              <a:t>3. </a:t>
             </a:r>
             <a:r>
               <a:rPr lang="zh-CN" altLang="en-US" sz="4000" dirty="0">
                 <a:latin typeface="Arial" panose="020B0604020202020204" pitchFamily="34" charset="0"/>
                 <a:cs typeface="Arial" panose="020B0604020202020204" pitchFamily="34" charset="0"/>
               </a:rPr>
-              <a:t>蒙特卡罗模拟法</a:t>
+              <a:t>旅行商问题</a:t>
             </a:r>
             <a:endParaRPr lang="en-US" altLang="zh-CN" sz="4000" dirty="0">
               <a:latin typeface="Arial" panose="020B0604020202020204" pitchFamily="34" charset="0"/>
@@ -22022,48 +22020,14 @@
                 <a:latin typeface="Arial" panose="020B0604020202020204" pitchFamily="34" charset="0"/>
                 <a:cs typeface="Arial" panose="020B0604020202020204" pitchFamily="34" charset="0"/>
               </a:rPr>
-              <a:t>4.</a:t>
-            </a:r>
-            <a:r>
-              <a:rPr lang="en-US" altLang="zh-CN" sz="3600" dirty="0">
-                <a:latin typeface="Arial" panose="020B0604020202020204" pitchFamily="34" charset="0"/>
-                <a:cs typeface="Arial" panose="020B0604020202020204" pitchFamily="34" charset="0"/>
-              </a:rPr>
-              <a:t>1</a:t>
-            </a:r>
-            <a:r>
-              <a:rPr lang="en-US" sz="3600" dirty="0">
-                <a:latin typeface="Arial" panose="020B0604020202020204" pitchFamily="34" charset="0"/>
-                <a:cs typeface="Arial" panose="020B0604020202020204" pitchFamily="34" charset="0"/>
-              </a:rPr>
-              <a:t> </a:t>
+              <a:t>3.2.4 3.2.5 </a:t>
             </a:r>
             <a:r>
               <a:rPr lang="zh-CN" altLang="en-US" sz="3600" dirty="0">
                 <a:latin typeface="Arial" panose="020B0604020202020204" pitchFamily="34" charset="0"/>
                 <a:cs typeface="Arial" panose="020B0604020202020204" pitchFamily="34" charset="0"/>
               </a:rPr>
-              <a:t>概率</a:t>
-            </a:r>
-            <a:endParaRPr lang="en-US" altLang="zh-CN" sz="3600" dirty="0">
-              <a:latin typeface="Arial" panose="020B0604020202020204" pitchFamily="34" charset="0"/>
-              <a:cs typeface="Arial" panose="020B0604020202020204" pitchFamily="34" charset="0"/>
-            </a:endParaRPr>
-          </a:p>
-          <a:p>
-            <a:r>
-              <a:rPr lang="en-US" sz="3600" dirty="0">
-                <a:latin typeface="Arial" panose="020B0604020202020204" pitchFamily="34" charset="0"/>
-                <a:cs typeface="Arial" panose="020B0604020202020204" pitchFamily="34" charset="0"/>
-              </a:rPr>
-              <a:t>4.2.2 </a:t>
-            </a:r>
-            <a:r>
-              <a:rPr lang="zh-CN" altLang="en-US" sz="3600" dirty="0">
-                <a:latin typeface="Arial" panose="020B0604020202020204" pitchFamily="34" charset="0"/>
-                <a:cs typeface="Arial" panose="020B0604020202020204" pitchFamily="34" charset="0"/>
-              </a:rPr>
-              <a:t>计算机骰子制作</a:t>
+              <a:t>利用遗传算法寻找最优路径</a:t>
             </a:r>
             <a:endParaRPr lang="en-US" sz="6600" dirty="0">
               <a:latin typeface="Arial" panose="020B0604020202020204" pitchFamily="34" charset="0"/>
@@ -22104,10 +22068,10 @@
       </p:pic>
       <p:pic>
         <p:nvPicPr>
-          <p:cNvPr id="7" name="Picture 6">
-            <a:extLst>
-              <a:ext uri="{FF2B5EF4-FFF2-40B4-BE49-F238E27FC236}">
-                <a16:creationId xmlns:a16="http://schemas.microsoft.com/office/drawing/2014/main" id="{DC445DFB-B48D-646A-5303-5B7E217496E5}"/>
+          <p:cNvPr id="4" name="Picture 3">
+            <a:extLst>
+              <a:ext uri="{FF2B5EF4-FFF2-40B4-BE49-F238E27FC236}">
+                <a16:creationId xmlns:a16="http://schemas.microsoft.com/office/drawing/2014/main" id="{976E4E9A-BFBC-803B-64AF-E5E398099D8F}"/>
               </a:ext>
             </a:extLst>
           </p:cNvPr>
@@ -22124,8 +22088,8 @@
         </p:blipFill>
         <p:spPr>
           <a:xfrm>
-            <a:off x="6541167" y="1530694"/>
-            <a:ext cx="5409174" cy="3796611"/>
+            <a:off x="5301114" y="2246503"/>
+            <a:ext cx="6738486" cy="2961727"/>
           </a:xfrm>
           <a:prstGeom prst="rect">
             <a:avLst/>
@@ -22145,7 +22109,7 @@
     </p:spTree>
     <p:extLst>
       <p:ext uri="{BB962C8B-B14F-4D97-AF65-F5344CB8AC3E}">
-        <p14:creationId xmlns:p14="http://schemas.microsoft.com/office/powerpoint/2010/main" val="1194481206"/>
+        <p14:creationId xmlns:p14="http://schemas.microsoft.com/office/powerpoint/2010/main" val="1210053382"/>
       </p:ext>
     </p:extLst>
   </p:cSld>
@@ -22409,7 +22373,7 @@
             <a:pPr algn="ctr"/>
             <a:r>
               <a:rPr lang="en-US" sz="6600" dirty="0"/>
-              <a:t>013</a:t>
+              <a:t>012</a:t>
             </a:r>
           </a:p>
         </p:txBody>
@@ -22430,8 +22394,8 @@
         </p:nvSpPr>
         <p:spPr>
           <a:xfrm>
-            <a:off x="241658" y="3792071"/>
-            <a:ext cx="5657117" cy="1755552"/>
+            <a:off x="241659" y="3792071"/>
+            <a:ext cx="5059456" cy="1755552"/>
           </a:xfrm>
           <a:prstGeom prst="rect">
             <a:avLst/>
@@ -22542,28 +22506,48 @@
                 <a:latin typeface="Arial" panose="020B0604020202020204" pitchFamily="34" charset="0"/>
                 <a:cs typeface="Arial" panose="020B0604020202020204" pitchFamily="34" charset="0"/>
               </a:rPr>
-              <a:t>4.2.3 </a:t>
+              <a:t>4.</a:t>
+            </a:r>
+            <a:r>
+              <a:rPr lang="en-US" altLang="zh-CN" sz="3600" dirty="0">
+                <a:latin typeface="Arial" panose="020B0604020202020204" pitchFamily="34" charset="0"/>
+                <a:cs typeface="Arial" panose="020B0604020202020204" pitchFamily="34" charset="0"/>
+              </a:rPr>
+              <a:t>1</a:t>
+            </a:r>
+            <a:r>
+              <a:rPr lang="en-US" sz="3600" dirty="0">
+                <a:latin typeface="Arial" panose="020B0604020202020204" pitchFamily="34" charset="0"/>
+                <a:cs typeface="Arial" panose="020B0604020202020204" pitchFamily="34" charset="0"/>
+              </a:rPr>
+              <a:t> </a:t>
             </a:r>
             <a:r>
               <a:rPr lang="zh-CN" altLang="en-US" sz="3600" dirty="0">
                 <a:latin typeface="Arial" panose="020B0604020202020204" pitchFamily="34" charset="0"/>
                 <a:cs typeface="Arial" panose="020B0604020202020204" pitchFamily="34" charset="0"/>
               </a:rPr>
-              <a:t>飞镖游戏，估算</a:t>
-            </a:r>
-            <a:r>
-              <a:rPr lang="el-GR" altLang="zh-CN" sz="3600" b="0" cap="none" dirty="0">
-                <a:latin typeface="Comic Sans MS" panose="030F0702030302020204" pitchFamily="66" charset="0"/>
+              <a:t>概率</a:t>
+            </a:r>
+            <a:endParaRPr lang="en-US" altLang="zh-CN" sz="3600" dirty="0">
+              <a:latin typeface="Arial" panose="020B0604020202020204" pitchFamily="34" charset="0"/>
+              <a:cs typeface="Arial" panose="020B0604020202020204" pitchFamily="34" charset="0"/>
+            </a:endParaRPr>
+          </a:p>
+          <a:p>
+            <a:r>
+              <a:rPr lang="en-US" sz="3600" dirty="0">
+                <a:latin typeface="Arial" panose="020B0604020202020204" pitchFamily="34" charset="0"/>
                 <a:cs typeface="Arial" panose="020B0604020202020204" pitchFamily="34" charset="0"/>
               </a:rPr>
-              <a:t>π</a:t>
+              <a:t>4.2.2 </a:t>
             </a:r>
             <a:r>
               <a:rPr lang="zh-CN" altLang="en-US" sz="3600" dirty="0">
                 <a:latin typeface="Arial" panose="020B0604020202020204" pitchFamily="34" charset="0"/>
-                <a:cs typeface="Latha" panose="020B0604020202020204" pitchFamily="34" charset="0"/>
+                <a:cs typeface="Arial" panose="020B0604020202020204" pitchFamily="34" charset="0"/>
               </a:rPr>
-              <a:t>值</a:t>
+              <a:t>计算机骰子制作</a:t>
             </a:r>
             <a:endParaRPr lang="en-US" sz="6600" dirty="0">
               <a:latin typeface="Arial" panose="020B0604020202020204" pitchFamily="34" charset="0"/>
@@ -22604,10 +22588,10 @@
       </p:pic>
       <p:pic>
         <p:nvPicPr>
-          <p:cNvPr id="4" name="Picture 3">
-            <a:extLst>
-              <a:ext uri="{FF2B5EF4-FFF2-40B4-BE49-F238E27FC236}">
-                <a16:creationId xmlns:a16="http://schemas.microsoft.com/office/drawing/2014/main" id="{C6FA16E5-6642-6191-3AE2-50FDAEACA17D}"/>
+          <p:cNvPr id="7" name="Picture 6">
+            <a:extLst>
+              <a:ext uri="{FF2B5EF4-FFF2-40B4-BE49-F238E27FC236}">
+                <a16:creationId xmlns:a16="http://schemas.microsoft.com/office/drawing/2014/main" id="{DC445DFB-B48D-646A-5303-5B7E217496E5}"/>
               </a:ext>
             </a:extLst>
           </p:cNvPr>
@@ -22624,8 +22608,8 @@
         </p:blipFill>
         <p:spPr>
           <a:xfrm>
-            <a:off x="6539924" y="1836589"/>
-            <a:ext cx="5452898" cy="3488445"/>
+            <a:off x="6541167" y="1530694"/>
+            <a:ext cx="5409174" cy="3796611"/>
           </a:xfrm>
           <a:prstGeom prst="rect">
             <a:avLst/>
@@ -22645,7 +22629,7 @@
     </p:spTree>
     <p:extLst>
       <p:ext uri="{BB962C8B-B14F-4D97-AF65-F5344CB8AC3E}">
-        <p14:creationId xmlns:p14="http://schemas.microsoft.com/office/powerpoint/2010/main" val="527291417"/>
+        <p14:creationId xmlns:p14="http://schemas.microsoft.com/office/powerpoint/2010/main" val="1194481206"/>
       </p:ext>
     </p:extLst>
   </p:cSld>
@@ -22909,7 +22893,7 @@
             <a:pPr algn="ctr"/>
             <a:r>
               <a:rPr lang="en-US" sz="6600" dirty="0"/>
-              <a:t>014</a:t>
+              <a:t>013</a:t>
             </a:r>
           </a:p>
         </p:txBody>
@@ -23042,14 +23026,28 @@
                 <a:latin typeface="Arial" panose="020B0604020202020204" pitchFamily="34" charset="0"/>
                 <a:cs typeface="Arial" panose="020B0604020202020204" pitchFamily="34" charset="0"/>
               </a:rPr>
-              <a:t>4.2.4 </a:t>
+              <a:t>4.2.3 </a:t>
             </a:r>
             <a:r>
               <a:rPr lang="zh-CN" altLang="en-US" sz="3600" dirty="0">
                 <a:latin typeface="Arial" panose="020B0604020202020204" pitchFamily="34" charset="0"/>
                 <a:cs typeface="Arial" panose="020B0604020202020204" pitchFamily="34" charset="0"/>
               </a:rPr>
-              <a:t>图形重叠区域面积的求解</a:t>
+              <a:t>飞镖游戏，估算</a:t>
+            </a:r>
+            <a:r>
+              <a:rPr lang="el-GR" altLang="zh-CN" sz="3600" b="0" cap="none" dirty="0">
+                <a:latin typeface="Comic Sans MS" panose="030F0702030302020204" pitchFamily="66" charset="0"/>
+                <a:cs typeface="Arial" panose="020B0604020202020204" pitchFamily="34" charset="0"/>
+              </a:rPr>
+              <a:t>π</a:t>
+            </a:r>
+            <a:r>
+              <a:rPr lang="zh-CN" altLang="en-US" sz="3600" dirty="0">
+                <a:latin typeface="Arial" panose="020B0604020202020204" pitchFamily="34" charset="0"/>
+                <a:cs typeface="Latha" panose="020B0604020202020204" pitchFamily="34" charset="0"/>
+              </a:rPr>
+              <a:t>值</a:t>
             </a:r>
             <a:endParaRPr lang="en-US" sz="6600" dirty="0">
               <a:latin typeface="Arial" panose="020B0604020202020204" pitchFamily="34" charset="0"/>
@@ -23090,10 +23088,10 @@
       </p:pic>
       <p:pic>
         <p:nvPicPr>
-          <p:cNvPr id="7" name="Picture 6">
-            <a:extLst>
-              <a:ext uri="{FF2B5EF4-FFF2-40B4-BE49-F238E27FC236}">
-                <a16:creationId xmlns:a16="http://schemas.microsoft.com/office/drawing/2014/main" id="{D899899B-A4EF-5552-8677-D15E11B3C166}"/>
+          <p:cNvPr id="4" name="Picture 3">
+            <a:extLst>
+              <a:ext uri="{FF2B5EF4-FFF2-40B4-BE49-F238E27FC236}">
+                <a16:creationId xmlns:a16="http://schemas.microsoft.com/office/drawing/2014/main" id="{C6FA16E5-6642-6191-3AE2-50FDAEACA17D}"/>
               </a:ext>
             </a:extLst>
           </p:cNvPr>
@@ -23110,8 +23108,8 @@
         </p:blipFill>
         <p:spPr>
           <a:xfrm>
-            <a:off x="6621413" y="1880924"/>
-            <a:ext cx="5384328" cy="3511132"/>
+            <a:off x="6539924" y="1836589"/>
+            <a:ext cx="5452898" cy="3488445"/>
           </a:xfrm>
           <a:prstGeom prst="rect">
             <a:avLst/>
@@ -23131,7 +23129,7 @@
     </p:spTree>
     <p:extLst>
       <p:ext uri="{BB962C8B-B14F-4D97-AF65-F5344CB8AC3E}">
-        <p14:creationId xmlns:p14="http://schemas.microsoft.com/office/powerpoint/2010/main" val="2914047852"/>
+        <p14:creationId xmlns:p14="http://schemas.microsoft.com/office/powerpoint/2010/main" val="527291417"/>
       </p:ext>
     </p:extLst>
   </p:cSld>
@@ -23395,7 +23393,7 @@
             <a:pPr algn="ctr"/>
             <a:r>
               <a:rPr lang="en-US" sz="6600" dirty="0"/>
-              <a:t>015</a:t>
+              <a:t>014</a:t>
             </a:r>
           </a:p>
         </p:txBody>
@@ -23528,14 +23526,14 @@
                 <a:latin typeface="Arial" panose="020B0604020202020204" pitchFamily="34" charset="0"/>
                 <a:cs typeface="Arial" panose="020B0604020202020204" pitchFamily="34" charset="0"/>
               </a:rPr>
-              <a:t>4.2.5 </a:t>
+              <a:t>4.2.4 </a:t>
             </a:r>
             <a:r>
               <a:rPr lang="zh-CN" altLang="en-US" sz="3600" dirty="0">
                 <a:latin typeface="Arial" panose="020B0604020202020204" pitchFamily="34" charset="0"/>
                 <a:cs typeface="Arial" panose="020B0604020202020204" pitchFamily="34" charset="0"/>
               </a:rPr>
-              <a:t>随机活动的国际象棋棋子的位置查找</a:t>
+              <a:t>图形重叠区域面积的求解</a:t>
             </a:r>
             <a:endParaRPr lang="en-US" sz="6600" dirty="0">
               <a:latin typeface="Arial" panose="020B0604020202020204" pitchFamily="34" charset="0"/>
@@ -23576,10 +23574,10 @@
       </p:pic>
       <p:pic>
         <p:nvPicPr>
-          <p:cNvPr id="4" name="Picture 3">
-            <a:extLst>
-              <a:ext uri="{FF2B5EF4-FFF2-40B4-BE49-F238E27FC236}">
-                <a16:creationId xmlns:a16="http://schemas.microsoft.com/office/drawing/2014/main" id="{C50692A1-3481-0099-33A7-BEBBF3DC3E89}"/>
+          <p:cNvPr id="7" name="Picture 6">
+            <a:extLst>
+              <a:ext uri="{FF2B5EF4-FFF2-40B4-BE49-F238E27FC236}">
+                <a16:creationId xmlns:a16="http://schemas.microsoft.com/office/drawing/2014/main" id="{D899899B-A4EF-5552-8677-D15E11B3C166}"/>
               </a:ext>
             </a:extLst>
           </p:cNvPr>
@@ -23596,8 +23594,8 @@
         </p:blipFill>
         <p:spPr>
           <a:xfrm>
-            <a:off x="6604185" y="1747178"/>
-            <a:ext cx="5472656" cy="3559927"/>
+            <a:off x="6621413" y="1880924"/>
+            <a:ext cx="5384328" cy="3511132"/>
           </a:xfrm>
           <a:prstGeom prst="rect">
             <a:avLst/>
@@ -23617,7 +23615,7 @@
     </p:spTree>
     <p:extLst>
       <p:ext uri="{BB962C8B-B14F-4D97-AF65-F5344CB8AC3E}">
-        <p14:creationId xmlns:p14="http://schemas.microsoft.com/office/powerpoint/2010/main" val="113727190"/>
+        <p14:creationId xmlns:p14="http://schemas.microsoft.com/office/powerpoint/2010/main" val="2914047852"/>
       </p:ext>
     </p:extLst>
   </p:cSld>
@@ -23881,7 +23879,7 @@
             <a:pPr algn="ctr"/>
             <a:r>
               <a:rPr lang="en-US" sz="6600" dirty="0"/>
-              <a:t>016</a:t>
+              <a:t>015</a:t>
             </a:r>
           </a:p>
         </p:txBody>
@@ -24014,14 +24012,14 @@
                 <a:latin typeface="Arial" panose="020B0604020202020204" pitchFamily="34" charset="0"/>
                 <a:cs typeface="Arial" panose="020B0604020202020204" pitchFamily="34" charset="0"/>
               </a:rPr>
-              <a:t>4.2.6 </a:t>
+              <a:t>4.2.5 </a:t>
             </a:r>
             <a:r>
               <a:rPr lang="zh-CN" altLang="en-US" sz="3600" dirty="0">
                 <a:latin typeface="Arial" panose="020B0604020202020204" pitchFamily="34" charset="0"/>
                 <a:cs typeface="Arial" panose="020B0604020202020204" pitchFamily="34" charset="0"/>
               </a:rPr>
-              <a:t>一维线段上任意两点之间的距离问题</a:t>
+              <a:t>随机活动的国际象棋棋子的位置查找</a:t>
             </a:r>
             <a:endParaRPr lang="en-US" sz="6600" dirty="0">
               <a:latin typeface="Arial" panose="020B0604020202020204" pitchFamily="34" charset="0"/>
@@ -24062,10 +24060,10 @@
       </p:pic>
       <p:pic>
         <p:nvPicPr>
-          <p:cNvPr id="7" name="Picture 6">
-            <a:extLst>
-              <a:ext uri="{FF2B5EF4-FFF2-40B4-BE49-F238E27FC236}">
-                <a16:creationId xmlns:a16="http://schemas.microsoft.com/office/drawing/2014/main" id="{C3F1559A-49D3-456E-65F5-FEA2C3D1A28D}"/>
+          <p:cNvPr id="4" name="Picture 3">
+            <a:extLst>
+              <a:ext uri="{FF2B5EF4-FFF2-40B4-BE49-F238E27FC236}">
+                <a16:creationId xmlns:a16="http://schemas.microsoft.com/office/drawing/2014/main" id="{C50692A1-3481-0099-33A7-BEBBF3DC3E89}"/>
               </a:ext>
             </a:extLst>
           </p:cNvPr>
@@ -24082,8 +24080,8 @@
         </p:blipFill>
         <p:spPr>
           <a:xfrm>
-            <a:off x="6537412" y="1902924"/>
-            <a:ext cx="5586719" cy="3502054"/>
+            <a:off x="6604185" y="1747178"/>
+            <a:ext cx="5472656" cy="3559927"/>
           </a:xfrm>
           <a:prstGeom prst="rect">
             <a:avLst/>
@@ -24103,7 +24101,7 @@
     </p:spTree>
     <p:extLst>
       <p:ext uri="{BB962C8B-B14F-4D97-AF65-F5344CB8AC3E}">
-        <p14:creationId xmlns:p14="http://schemas.microsoft.com/office/powerpoint/2010/main" val="79649016"/>
+        <p14:creationId xmlns:p14="http://schemas.microsoft.com/office/powerpoint/2010/main" val="113727190"/>
       </p:ext>
     </p:extLst>
   </p:cSld>
@@ -24367,7 +24365,7 @@
             <a:pPr algn="ctr"/>
             <a:r>
               <a:rPr lang="en-US" sz="6600" dirty="0"/>
-              <a:t>017</a:t>
+              <a:t>016</a:t>
             </a:r>
           </a:p>
         </p:txBody>
@@ -24500,14 +24498,14 @@
                 <a:latin typeface="Arial" panose="020B0604020202020204" pitchFamily="34" charset="0"/>
                 <a:cs typeface="Arial" panose="020B0604020202020204" pitchFamily="34" charset="0"/>
               </a:rPr>
-              <a:t>4.2.8 </a:t>
+              <a:t>4.2.6 </a:t>
             </a:r>
             <a:r>
               <a:rPr lang="zh-CN" altLang="en-US" sz="3600" dirty="0">
                 <a:latin typeface="Arial" panose="020B0604020202020204" pitchFamily="34" charset="0"/>
                 <a:cs typeface="Arial" panose="020B0604020202020204" pitchFamily="34" charset="0"/>
               </a:rPr>
-              <a:t>二维空间中两点间的距离问题</a:t>
+              <a:t>一维线段上任意两点之间的距离问题</a:t>
             </a:r>
             <a:endParaRPr lang="en-US" sz="6600" dirty="0">
               <a:latin typeface="Arial" panose="020B0604020202020204" pitchFamily="34" charset="0"/>
@@ -24548,10 +24546,10 @@
       </p:pic>
       <p:pic>
         <p:nvPicPr>
-          <p:cNvPr id="4" name="Picture 3">
-            <a:extLst>
-              <a:ext uri="{FF2B5EF4-FFF2-40B4-BE49-F238E27FC236}">
-                <a16:creationId xmlns:a16="http://schemas.microsoft.com/office/drawing/2014/main" id="{83F7030E-9E8F-629B-6E53-40C490F01845}"/>
+          <p:cNvPr id="7" name="Picture 6">
+            <a:extLst>
+              <a:ext uri="{FF2B5EF4-FFF2-40B4-BE49-F238E27FC236}">
+                <a16:creationId xmlns:a16="http://schemas.microsoft.com/office/drawing/2014/main" id="{C3F1559A-49D3-456E-65F5-FEA2C3D1A28D}"/>
               </a:ext>
             </a:extLst>
           </p:cNvPr>
@@ -24568,8 +24566,8 @@
         </p:blipFill>
         <p:spPr>
           <a:xfrm>
-            <a:off x="6493853" y="1903403"/>
-            <a:ext cx="5456488" cy="3357493"/>
+            <a:off x="6537412" y="1902924"/>
+            <a:ext cx="5586719" cy="3502054"/>
           </a:xfrm>
           <a:prstGeom prst="rect">
             <a:avLst/>
@@ -24589,7 +24587,7 @@
     </p:spTree>
     <p:extLst>
       <p:ext uri="{BB962C8B-B14F-4D97-AF65-F5344CB8AC3E}">
-        <p14:creationId xmlns:p14="http://schemas.microsoft.com/office/powerpoint/2010/main" val="333877040"/>
+        <p14:creationId xmlns:p14="http://schemas.microsoft.com/office/powerpoint/2010/main" val="79649016"/>
       </p:ext>
     </p:extLst>
   </p:cSld>
@@ -24853,7 +24851,7 @@
             <a:pPr algn="ctr"/>
             <a:r>
               <a:rPr lang="en-US" sz="6600" dirty="0"/>
-              <a:t>018</a:t>
+              <a:t>017</a:t>
             </a:r>
           </a:p>
         </p:txBody>
@@ -24986,14 +24984,14 @@
                 <a:latin typeface="Arial" panose="020B0604020202020204" pitchFamily="34" charset="0"/>
                 <a:cs typeface="Arial" panose="020B0604020202020204" pitchFamily="34" charset="0"/>
               </a:rPr>
-              <a:t>4.2.10 </a:t>
+              <a:t>4.2.8 </a:t>
             </a:r>
             <a:r>
               <a:rPr lang="zh-CN" altLang="en-US" sz="3600" dirty="0">
                 <a:latin typeface="Arial" panose="020B0604020202020204" pitchFamily="34" charset="0"/>
                 <a:cs typeface="Arial" panose="020B0604020202020204" pitchFamily="34" charset="0"/>
               </a:rPr>
-              <a:t>三维空间中两点间的距离问题</a:t>
+              <a:t>二维空间中两点间的距离问题</a:t>
             </a:r>
             <a:endParaRPr lang="en-US" sz="6600" dirty="0">
               <a:latin typeface="Arial" panose="020B0604020202020204" pitchFamily="34" charset="0"/>
@@ -25034,10 +25032,10 @@
       </p:pic>
       <p:pic>
         <p:nvPicPr>
-          <p:cNvPr id="7" name="Picture 6">
-            <a:extLst>
-              <a:ext uri="{FF2B5EF4-FFF2-40B4-BE49-F238E27FC236}">
-                <a16:creationId xmlns:a16="http://schemas.microsoft.com/office/drawing/2014/main" id="{0FD13363-09D1-1B41-1F84-A6ADE58D1057}"/>
+          <p:cNvPr id="4" name="Picture 3">
+            <a:extLst>
+              <a:ext uri="{FF2B5EF4-FFF2-40B4-BE49-F238E27FC236}">
+                <a16:creationId xmlns:a16="http://schemas.microsoft.com/office/drawing/2014/main" id="{83F7030E-9E8F-629B-6E53-40C490F01845}"/>
               </a:ext>
             </a:extLst>
           </p:cNvPr>
@@ -25054,8 +25052,8 @@
         </p:blipFill>
         <p:spPr>
           <a:xfrm>
-            <a:off x="6477685" y="1816462"/>
-            <a:ext cx="5584112" cy="3490643"/>
+            <a:off x="6493853" y="1903403"/>
+            <a:ext cx="5456488" cy="3357493"/>
           </a:xfrm>
           <a:prstGeom prst="rect">
             <a:avLst/>
@@ -25075,7 +25073,7 @@
     </p:spTree>
     <p:extLst>
       <p:ext uri="{BB962C8B-B14F-4D97-AF65-F5344CB8AC3E}">
-        <p14:creationId xmlns:p14="http://schemas.microsoft.com/office/powerpoint/2010/main" val="2773668242"/>
+        <p14:creationId xmlns:p14="http://schemas.microsoft.com/office/powerpoint/2010/main" val="333877040"/>
       </p:ext>
     </p:extLst>
   </p:cSld>
@@ -25120,6 +25118,257 @@
         </p:nvSpPr>
         <p:spPr>
           <a:xfrm>
+            <a:off x="344129" y="589939"/>
+            <a:ext cx="7159608" cy="2904376"/>
+          </a:xfrm>
+        </p:spPr>
+        <p:txBody>
+          <a:bodyPr/>
+          <a:lstStyle/>
+          <a:p>
+            <a:r>
+              <a:rPr lang="zh-CN" altLang="en-US" sz="7200" dirty="0"/>
+              <a:t>编程数学</a:t>
+            </a:r>
+            <a:br>
+              <a:rPr lang="en-US" altLang="zh-CN" sz="7200" dirty="0"/>
+            </a:br>
+            <a:r>
+              <a:rPr lang="en-US" altLang="zh-CN" sz="4400" dirty="0"/>
+              <a:t>Using Octave for Coding Mathematics</a:t>
+            </a:r>
+            <a:endParaRPr lang="en-US" sz="7200" dirty="0"/>
+          </a:p>
+        </p:txBody>
+      </p:sp>
+      <p:sp>
+        <p:nvSpPr>
+          <p:cNvPr id="18" name="Text Placeholder 17">
+            <a:extLst>
+              <a:ext uri="{FF2B5EF4-FFF2-40B4-BE49-F238E27FC236}">
+                <a16:creationId xmlns:a16="http://schemas.microsoft.com/office/drawing/2014/main" id="{D62CC159-4789-0E92-08AE-ECCAB12B677E}"/>
+              </a:ext>
+            </a:extLst>
+          </p:cNvPr>
+          <p:cNvSpPr>
+            <a:spLocks noGrp="1"/>
+          </p:cNvSpPr>
+          <p:nvPr>
+            <p:ph type="body" sz="quarter" idx="11"/>
+          </p:nvPr>
+        </p:nvSpPr>
+        <p:spPr>
+          <a:xfrm>
+            <a:off x="8801493" y="5547623"/>
+            <a:ext cx="3322638" cy="904824"/>
+          </a:xfrm>
+        </p:spPr>
+        <p:txBody>
+          <a:bodyPr/>
+          <a:lstStyle/>
+          <a:p>
+            <a:endParaRPr lang="en-US" dirty="0"/>
+          </a:p>
+        </p:txBody>
+      </p:sp>
+      <p:pic>
+        <p:nvPicPr>
+          <p:cNvPr id="6" name="Picture 5">
+            <a:extLst>
+              <a:ext uri="{FF2B5EF4-FFF2-40B4-BE49-F238E27FC236}">
+                <a16:creationId xmlns:a16="http://schemas.microsoft.com/office/drawing/2014/main" id="{31D9A30F-7C62-08F0-1D61-6C98711B41A5}"/>
+              </a:ext>
+            </a:extLst>
+          </p:cNvPr>
+          <p:cNvPicPr>
+            <a:picLocks noChangeAspect="1"/>
+          </p:cNvPicPr>
+          <p:nvPr/>
+        </p:nvPicPr>
+        <p:blipFill>
+          <a:blip r:embed="rId3"/>
+          <a:stretch>
+            <a:fillRect/>
+          </a:stretch>
+        </p:blipFill>
+        <p:spPr>
+          <a:xfrm>
+            <a:off x="8975282" y="5690267"/>
+            <a:ext cx="2975059" cy="619535"/>
+          </a:xfrm>
+          <a:prstGeom prst="rect">
+            <a:avLst/>
+          </a:prstGeom>
+          <a:ln>
+            <a:noFill/>
+          </a:ln>
+          <a:effectLst>
+            <a:outerShdw blurRad="292100" dist="139700" dir="2700000" algn="tl" rotWithShape="0">
+              <a:srgbClr val="333333">
+                <a:alpha val="65000"/>
+              </a:srgbClr>
+            </a:outerShdw>
+          </a:effectLst>
+        </p:spPr>
+      </p:pic>
+      <p:sp>
+        <p:nvSpPr>
+          <p:cNvPr id="8" name="TextBox 7">
+            <a:extLst>
+              <a:ext uri="{FF2B5EF4-FFF2-40B4-BE49-F238E27FC236}">
+                <a16:creationId xmlns:a16="http://schemas.microsoft.com/office/drawing/2014/main" id="{A08B22CE-72AD-D68D-8B0E-91CE1ABDD3E0}"/>
+              </a:ext>
+            </a:extLst>
+          </p:cNvPr>
+          <p:cNvSpPr txBox="1"/>
+          <p:nvPr/>
+        </p:nvSpPr>
+        <p:spPr>
+          <a:xfrm>
+            <a:off x="241659" y="5744561"/>
+            <a:ext cx="6953052" cy="707886"/>
+          </a:xfrm>
+          <a:prstGeom prst="rect">
+            <a:avLst/>
+          </a:prstGeom>
+          <a:solidFill>
+            <a:schemeClr val="bg1"/>
+          </a:solidFill>
+        </p:spPr>
+        <p:txBody>
+          <a:bodyPr wrap="square">
+            <a:spAutoFit/>
+          </a:bodyPr>
+          <a:lstStyle/>
+          <a:p>
+            <a:r>
+              <a:rPr lang="en-US" altLang="zh-CN" sz="2000" dirty="0"/>
+              <a:t>GitHub: </a:t>
+            </a:r>
+            <a:r>
+              <a:rPr lang="en-US" sz="2000" dirty="0">
+                <a:hlinkClick r:id="rId4"/>
+              </a:rPr>
+              <a:t>https://github.com/yasenstar/learn_octave/tree/main/CodingMath</a:t>
+            </a:r>
+            <a:endParaRPr lang="en-US" sz="2000" dirty="0"/>
+          </a:p>
+        </p:txBody>
+      </p:sp>
+      <p:pic>
+        <p:nvPicPr>
+          <p:cNvPr id="2" name="Picture 1">
+            <a:extLst>
+              <a:ext uri="{FF2B5EF4-FFF2-40B4-BE49-F238E27FC236}">
+                <a16:creationId xmlns:a16="http://schemas.microsoft.com/office/drawing/2014/main" id="{B700CC5F-8DB1-33F2-D8E0-B20B30D66853}"/>
+              </a:ext>
+            </a:extLst>
+          </p:cNvPr>
+          <p:cNvPicPr>
+            <a:picLocks noChangeAspect="1"/>
+          </p:cNvPicPr>
+          <p:nvPr/>
+        </p:nvPicPr>
+        <p:blipFill>
+          <a:blip r:embed="rId5"/>
+          <a:stretch>
+            <a:fillRect/>
+          </a:stretch>
+        </p:blipFill>
+        <p:spPr>
+          <a:xfrm>
+            <a:off x="2202489" y="3636840"/>
+            <a:ext cx="3157980" cy="1965196"/>
+          </a:xfrm>
+          <a:prstGeom prst="rect">
+            <a:avLst/>
+          </a:prstGeom>
+          <a:ln>
+            <a:noFill/>
+          </a:ln>
+          <a:effectLst>
+            <a:softEdge rad="112500"/>
+          </a:effectLst>
+        </p:spPr>
+      </p:pic>
+      <p:pic>
+        <p:nvPicPr>
+          <p:cNvPr id="7" name="Picture 6">
+            <a:extLst>
+              <a:ext uri="{FF2B5EF4-FFF2-40B4-BE49-F238E27FC236}">
+                <a16:creationId xmlns:a16="http://schemas.microsoft.com/office/drawing/2014/main" id="{D2C4C55D-3244-1AC6-5058-AC70398D13F8}"/>
+              </a:ext>
+            </a:extLst>
+          </p:cNvPr>
+          <p:cNvPicPr>
+            <a:picLocks noChangeAspect="1"/>
+          </p:cNvPicPr>
+          <p:nvPr/>
+        </p:nvPicPr>
+        <p:blipFill>
+          <a:blip r:embed="rId6"/>
+          <a:stretch>
+            <a:fillRect/>
+          </a:stretch>
+        </p:blipFill>
+        <p:spPr>
+          <a:xfrm>
+            <a:off x="7984593" y="1209833"/>
+            <a:ext cx="2808593" cy="4055334"/>
+          </a:xfrm>
+          <a:prstGeom prst="rect">
+            <a:avLst/>
+          </a:prstGeom>
+        </p:spPr>
+      </p:pic>
+    </p:spTree>
+    <p:extLst>
+      <p:ext uri="{BB962C8B-B14F-4D97-AF65-F5344CB8AC3E}">
+        <p14:creationId xmlns:p14="http://schemas.microsoft.com/office/powerpoint/2010/main" val="172385740"/>
+      </p:ext>
+    </p:extLst>
+  </p:cSld>
+  <p:clrMapOvr>
+    <a:masterClrMapping/>
+  </p:clrMapOvr>
+</p:sld>
+</file>
+
+<file path=ppt/slides/slide20.xml><?xml version="1.0" encoding="utf-8"?>
+<p:sld xmlns:a="http://schemas.openxmlformats.org/drawingml/2006/main" xmlns:r="http://schemas.openxmlformats.org/officeDocument/2006/relationships" xmlns:p="http://schemas.openxmlformats.org/presentationml/2006/main">
+  <p:cSld>
+    <p:spTree>
+      <p:nvGrpSpPr>
+        <p:cNvPr id="1" name=""/>
+        <p:cNvGrpSpPr/>
+        <p:nvPr/>
+      </p:nvGrpSpPr>
+      <p:grpSpPr>
+        <a:xfrm>
+          <a:off x="0" y="0"/>
+          <a:ext cx="0" cy="0"/>
+          <a:chOff x="0" y="0"/>
+          <a:chExt cx="0" cy="0"/>
+        </a:xfrm>
+      </p:grpSpPr>
+      <p:sp>
+        <p:nvSpPr>
+          <p:cNvPr id="17" name="Title 16">
+            <a:extLst>
+              <a:ext uri="{FF2B5EF4-FFF2-40B4-BE49-F238E27FC236}">
+                <a16:creationId xmlns:a16="http://schemas.microsoft.com/office/drawing/2014/main" id="{2A7A4DC1-E50C-440F-5AAD-B8FF3E74FA45}"/>
+              </a:ext>
+            </a:extLst>
+          </p:cNvPr>
+          <p:cNvSpPr>
+            <a:spLocks noGrp="1"/>
+          </p:cNvSpPr>
+          <p:nvPr>
+            <p:ph type="title"/>
+          </p:nvPr>
+        </p:nvSpPr>
+        <p:spPr>
+          <a:xfrm>
             <a:off x="241659" y="335415"/>
             <a:ext cx="5151698" cy="2219250"/>
           </a:xfrm>
@@ -25197,8 +25446,8 @@
         </p:blipFill>
         <p:spPr>
           <a:xfrm>
-            <a:off x="4850446" y="244301"/>
-            <a:ext cx="1948199" cy="2401478"/>
+            <a:off x="4850447" y="244301"/>
+            <a:ext cx="1627238" cy="2005840"/>
           </a:xfrm>
           <a:prstGeom prst="rect">
             <a:avLst/>
@@ -25339,7 +25588,7 @@
             <a:pPr algn="ctr"/>
             <a:r>
               <a:rPr lang="en-US" sz="6600" dirty="0"/>
-              <a:t>001</a:t>
+              <a:t>018</a:t>
             </a:r>
           </a:p>
         </p:txBody>
@@ -25360,8 +25609,8 @@
         </p:nvSpPr>
         <p:spPr>
           <a:xfrm>
-            <a:off x="241658" y="3662661"/>
-            <a:ext cx="6953051" cy="1884962"/>
+            <a:off x="241658" y="3792071"/>
+            <a:ext cx="5657117" cy="1755552"/>
           </a:xfrm>
           <a:prstGeom prst="rect">
             <a:avLst/>
@@ -25448,20 +25697,40 @@
           </a:lstStyle>
           <a:p>
             <a:r>
-              <a:rPr lang="zh-CN" altLang="en-US" sz="4400" dirty="0">
+              <a:rPr lang="en-US" altLang="zh-CN" sz="4000" dirty="0">
                 <a:latin typeface="Arial" panose="020B0604020202020204" pitchFamily="34" charset="0"/>
                 <a:cs typeface="Arial" panose="020B0604020202020204" pitchFamily="34" charset="0"/>
               </a:rPr>
-              <a:t>开篇与介绍 </a:t>
-            </a:r>
-            <a:r>
-              <a:rPr lang="en-US" altLang="zh-CN" sz="4400" dirty="0">
+              <a:t>4. </a:t>
+            </a:r>
+            <a:r>
+              <a:rPr lang="zh-CN" altLang="en-US" sz="4000" dirty="0">
                 <a:latin typeface="Arial" panose="020B0604020202020204" pitchFamily="34" charset="0"/>
                 <a:cs typeface="Arial" panose="020B0604020202020204" pitchFamily="34" charset="0"/>
               </a:rPr>
-              <a:t>Opening</a:t>
-            </a:r>
-            <a:endParaRPr lang="en-US" sz="4400" dirty="0">
+              <a:t>蒙特卡罗模拟法</a:t>
+            </a:r>
+            <a:endParaRPr lang="en-US" altLang="zh-CN" sz="4000" dirty="0">
+              <a:latin typeface="Arial" panose="020B0604020202020204" pitchFamily="34" charset="0"/>
+              <a:cs typeface="Arial" panose="020B0604020202020204" pitchFamily="34" charset="0"/>
+            </a:endParaRPr>
+          </a:p>
+          <a:p>
+            <a:r>
+              <a:rPr lang="en-US" sz="3600" dirty="0">
+                <a:latin typeface="Arial" panose="020B0604020202020204" pitchFamily="34" charset="0"/>
+                <a:cs typeface="Arial" panose="020B0604020202020204" pitchFamily="34" charset="0"/>
+              </a:rPr>
+              <a:t>4.2.10 </a:t>
+            </a:r>
+            <a:r>
+              <a:rPr lang="zh-CN" altLang="en-US" sz="3600" dirty="0">
+                <a:latin typeface="Arial" panose="020B0604020202020204" pitchFamily="34" charset="0"/>
+                <a:cs typeface="Arial" panose="020B0604020202020204" pitchFamily="34" charset="0"/>
+              </a:rPr>
+              <a:t>三维空间中两点间的距离问题</a:t>
+            </a:r>
+            <a:endParaRPr lang="en-US" sz="6600" dirty="0">
               <a:latin typeface="Arial" panose="020B0604020202020204" pitchFamily="34" charset="0"/>
               <a:cs typeface="Arial" panose="020B0604020202020204" pitchFamily="34" charset="0"/>
             </a:endParaRPr>
@@ -25470,10 +25739,10 @@
       </p:sp>
       <p:pic>
         <p:nvPicPr>
-          <p:cNvPr id="10" name="Picture 9">
-            <a:extLst>
-              <a:ext uri="{FF2B5EF4-FFF2-40B4-BE49-F238E27FC236}">
-                <a16:creationId xmlns:a16="http://schemas.microsoft.com/office/drawing/2014/main" id="{16D01DD7-8A54-422F-9168-2C5D252BD3BE}"/>
+          <p:cNvPr id="11" name="Picture 10">
+            <a:extLst>
+              <a:ext uri="{FF2B5EF4-FFF2-40B4-BE49-F238E27FC236}">
+                <a16:creationId xmlns:a16="http://schemas.microsoft.com/office/drawing/2014/main" id="{16FFAF40-C7C3-81F4-64CA-AB1B6B9B27C1}"/>
               </a:ext>
             </a:extLst>
           </p:cNvPr>
@@ -25490,8 +25759,38 @@
         </p:blipFill>
         <p:spPr>
           <a:xfrm>
-            <a:off x="6872140" y="1175878"/>
-            <a:ext cx="4931356" cy="4229100"/>
+            <a:off x="9029070" y="423768"/>
+            <a:ext cx="2714625" cy="666750"/>
+          </a:xfrm>
+          <a:prstGeom prst="rect">
+            <a:avLst/>
+          </a:prstGeom>
+        </p:spPr>
+      </p:pic>
+      <p:pic>
+        <p:nvPicPr>
+          <p:cNvPr id="7" name="Picture 6">
+            <a:extLst>
+              <a:ext uri="{FF2B5EF4-FFF2-40B4-BE49-F238E27FC236}">
+                <a16:creationId xmlns:a16="http://schemas.microsoft.com/office/drawing/2014/main" id="{0FD13363-09D1-1B41-1F84-A6ADE58D1057}"/>
+              </a:ext>
+            </a:extLst>
+          </p:cNvPr>
+          <p:cNvPicPr>
+            <a:picLocks noChangeAspect="1"/>
+          </p:cNvPicPr>
+          <p:nvPr/>
+        </p:nvPicPr>
+        <p:blipFill>
+          <a:blip r:embed="rId7"/>
+          <a:stretch>
+            <a:fillRect/>
+          </a:stretch>
+        </p:blipFill>
+        <p:spPr>
+          <a:xfrm>
+            <a:off x="6477685" y="1816462"/>
+            <a:ext cx="5584112" cy="3490643"/>
           </a:xfrm>
           <a:prstGeom prst="rect">
             <a:avLst/>
@@ -25508,40 +25807,10 @@
           </a:effectLst>
         </p:spPr>
       </p:pic>
-      <p:pic>
-        <p:nvPicPr>
-          <p:cNvPr id="3" name="Picture 2">
-            <a:extLst>
-              <a:ext uri="{FF2B5EF4-FFF2-40B4-BE49-F238E27FC236}">
-                <a16:creationId xmlns:a16="http://schemas.microsoft.com/office/drawing/2014/main" id="{0A942A95-94F2-F63B-7532-E1B07B2A4C85}"/>
-              </a:ext>
-            </a:extLst>
-          </p:cNvPr>
-          <p:cNvPicPr>
-            <a:picLocks noChangeAspect="1"/>
-          </p:cNvPicPr>
-          <p:nvPr/>
-        </p:nvPicPr>
-        <p:blipFill>
-          <a:blip r:embed="rId7"/>
-          <a:stretch>
-            <a:fillRect/>
-          </a:stretch>
-        </p:blipFill>
-        <p:spPr>
-          <a:xfrm>
-            <a:off x="9029070" y="423768"/>
-            <a:ext cx="2714625" cy="666750"/>
-          </a:xfrm>
-          <a:prstGeom prst="rect">
-            <a:avLst/>
-          </a:prstGeom>
-        </p:spPr>
-      </p:pic>
     </p:spTree>
     <p:extLst>
       <p:ext uri="{BB962C8B-B14F-4D97-AF65-F5344CB8AC3E}">
-        <p14:creationId xmlns:p14="http://schemas.microsoft.com/office/powerpoint/2010/main" val="518478275"/>
+        <p14:creationId xmlns:p14="http://schemas.microsoft.com/office/powerpoint/2010/main" val="2773668242"/>
       </p:ext>
     </p:extLst>
   </p:cSld>
@@ -25551,7 +25820,7 @@
 </p:sld>
 </file>
 
-<file path=ppt/slides/slide20.xml><?xml version="1.0" encoding="utf-8"?>
+<file path=ppt/slides/slide21.xml><?xml version="1.0" encoding="utf-8"?>
 <p:sld xmlns:a="http://schemas.openxmlformats.org/drawingml/2006/main" xmlns:r="http://schemas.openxmlformats.org/officeDocument/2006/relationships" xmlns:p="http://schemas.openxmlformats.org/presentationml/2006/main">
   <p:cSld>
     <p:spTree>
@@ -26071,7 +26340,7 @@
 </p:sld>
 </file>
 
-<file path=ppt/slides/slide21.xml><?xml version="1.0" encoding="utf-8"?>
+<file path=ppt/slides/slide22.xml><?xml version="1.0" encoding="utf-8"?>
 <p:sld xmlns:a="http://schemas.openxmlformats.org/drawingml/2006/main" xmlns:r="http://schemas.openxmlformats.org/officeDocument/2006/relationships" xmlns:p="http://schemas.openxmlformats.org/presentationml/2006/main">
   <p:cSld>
     <p:spTree>
@@ -26592,7 +26861,7 @@
 </p:sld>
 </file>
 
-<file path=ppt/slides/slide22.xml><?xml version="1.0" encoding="utf-8"?>
+<file path=ppt/slides/slide23.xml><?xml version="1.0" encoding="utf-8"?>
 <p:sld xmlns:a="http://schemas.openxmlformats.org/drawingml/2006/main" xmlns:r="http://schemas.openxmlformats.org/officeDocument/2006/relationships" xmlns:p="http://schemas.openxmlformats.org/presentationml/2006/main">
   <p:cSld>
     <p:spTree>
@@ -27088,7 +27357,7 @@
 </p:sld>
 </file>
 
-<file path=ppt/slides/slide23.xml><?xml version="1.0" encoding="utf-8"?>
+<file path=ppt/slides/slide24.xml><?xml version="1.0" encoding="utf-8"?>
 <p:sld xmlns:a="http://schemas.openxmlformats.org/drawingml/2006/main" xmlns:r="http://schemas.openxmlformats.org/officeDocument/2006/relationships" xmlns:p="http://schemas.openxmlformats.org/presentationml/2006/main">
   <p:cSld>
     <p:spTree>
@@ -27609,7 +27878,7 @@
 </p:sld>
 </file>
 
-<file path=ppt/slides/slide24.xml><?xml version="1.0" encoding="utf-8"?>
+<file path=ppt/slides/slide25.xml><?xml version="1.0" encoding="utf-8"?>
 <p:sld xmlns:a="http://schemas.openxmlformats.org/drawingml/2006/main" xmlns:r="http://schemas.openxmlformats.org/officeDocument/2006/relationships" xmlns:p="http://schemas.openxmlformats.org/presentationml/2006/main">
   <p:cSld>
     <p:spTree>
@@ -28105,7 +28374,7 @@
 </p:sld>
 </file>
 
-<file path=ppt/slides/slide25.xml><?xml version="1.0" encoding="utf-8"?>
+<file path=ppt/slides/slide26.xml><?xml version="1.0" encoding="utf-8"?>
 <p:sld xmlns:a="http://schemas.openxmlformats.org/drawingml/2006/main" xmlns:r="http://schemas.openxmlformats.org/officeDocument/2006/relationships" xmlns:p="http://schemas.openxmlformats.org/presentationml/2006/main">
   <p:cSld>
     <p:spTree>
@@ -28651,7 +28920,7 @@
 </p:sld>
 </file>
 
-<file path=ppt/slides/slide26.xml><?xml version="1.0" encoding="utf-8"?>
+<file path=ppt/slides/slide27.xml><?xml version="1.0" encoding="utf-8"?>
 <p:sld xmlns:a="http://schemas.openxmlformats.org/drawingml/2006/main" xmlns:r="http://schemas.openxmlformats.org/officeDocument/2006/relationships" xmlns:p="http://schemas.openxmlformats.org/presentationml/2006/main">
   <p:cSld>
     <p:spTree>
@@ -29717,7 +29986,7 @@
             <a:pPr algn="ctr"/>
             <a:r>
               <a:rPr lang="en-US" sz="6600" dirty="0"/>
-              <a:t>002</a:t>
+              <a:t>001</a:t>
             </a:r>
           </a:p>
         </p:txBody>
@@ -29826,18 +30095,18 @@
           </a:lstStyle>
           <a:p>
             <a:r>
+              <a:rPr lang="zh-CN" altLang="en-US" sz="4400" dirty="0">
+                <a:latin typeface="Arial" panose="020B0604020202020204" pitchFamily="34" charset="0"/>
+                <a:cs typeface="Arial" panose="020B0604020202020204" pitchFamily="34" charset="0"/>
+              </a:rPr>
+              <a:t>开篇与介绍 </a:t>
+            </a:r>
+            <a:r>
               <a:rPr lang="en-US" altLang="zh-CN" sz="4400" dirty="0">
                 <a:latin typeface="Arial" panose="020B0604020202020204" pitchFamily="34" charset="0"/>
                 <a:cs typeface="Arial" panose="020B0604020202020204" pitchFamily="34" charset="0"/>
               </a:rPr>
-              <a:t>1. Octave</a:t>
-            </a:r>
-            <a:r>
-              <a:rPr lang="zh-CN" altLang="en-US" sz="4400" dirty="0">
-                <a:latin typeface="Arial" panose="020B0604020202020204" pitchFamily="34" charset="0"/>
-                <a:cs typeface="Arial" panose="020B0604020202020204" pitchFamily="34" charset="0"/>
-              </a:rPr>
-              <a:t>的安装和使用</a:t>
+              <a:t>Opening</a:t>
             </a:r>
             <a:endParaRPr lang="en-US" sz="4400" dirty="0">
               <a:latin typeface="Arial" panose="020B0604020202020204" pitchFamily="34" charset="0"/>
@@ -29848,10 +30117,10 @@
       </p:sp>
       <p:pic>
         <p:nvPicPr>
-          <p:cNvPr id="4" name="Picture 3">
-            <a:extLst>
-              <a:ext uri="{FF2B5EF4-FFF2-40B4-BE49-F238E27FC236}">
-                <a16:creationId xmlns:a16="http://schemas.microsoft.com/office/drawing/2014/main" id="{909E2C25-2993-E165-73AA-7BF51BB47383}"/>
+          <p:cNvPr id="10" name="Picture 9">
+            <a:extLst>
+              <a:ext uri="{FF2B5EF4-FFF2-40B4-BE49-F238E27FC236}">
+                <a16:creationId xmlns:a16="http://schemas.microsoft.com/office/drawing/2014/main" id="{16D01DD7-8A54-422F-9168-2C5D252BD3BE}"/>
               </a:ext>
             </a:extLst>
           </p:cNvPr>
@@ -29868,12 +30137,22 @@
         </p:blipFill>
         <p:spPr>
           <a:xfrm>
-            <a:off x="7428323" y="2038641"/>
-            <a:ext cx="4289196" cy="2919858"/>
+            <a:off x="6872140" y="1175878"/>
+            <a:ext cx="4931356" cy="4229100"/>
           </a:xfrm>
           <a:prstGeom prst="rect">
             <a:avLst/>
           </a:prstGeom>
+          <a:ln>
+            <a:noFill/>
+          </a:ln>
+          <a:effectLst>
+            <a:outerShdw blurRad="292100" dist="139700" dir="2700000" algn="tl" rotWithShape="0">
+              <a:srgbClr val="333333">
+                <a:alpha val="65000"/>
+              </a:srgbClr>
+            </a:outerShdw>
+          </a:effectLst>
         </p:spPr>
       </p:pic>
       <p:pic>
@@ -29881,7 +30160,7 @@
           <p:cNvPr id="3" name="Picture 2">
             <a:extLst>
               <a:ext uri="{FF2B5EF4-FFF2-40B4-BE49-F238E27FC236}">
-                <a16:creationId xmlns:a16="http://schemas.microsoft.com/office/drawing/2014/main" id="{879A8606-D9E7-465D-0065-C93981061B03}"/>
+                <a16:creationId xmlns:a16="http://schemas.microsoft.com/office/drawing/2014/main" id="{0A942A95-94F2-F63B-7532-E1B07B2A4C85}"/>
               </a:ext>
             </a:extLst>
           </p:cNvPr>
@@ -29909,7 +30188,7 @@
     </p:spTree>
     <p:extLst>
       <p:ext uri="{BB962C8B-B14F-4D97-AF65-F5344CB8AC3E}">
-        <p14:creationId xmlns:p14="http://schemas.microsoft.com/office/powerpoint/2010/main" val="3909585765"/>
+        <p14:creationId xmlns:p14="http://schemas.microsoft.com/office/powerpoint/2010/main" val="518478275"/>
       </p:ext>
     </p:extLst>
   </p:cSld>
@@ -30031,8 +30310,8 @@
         </p:blipFill>
         <p:spPr>
           <a:xfrm>
-            <a:off x="4850447" y="244301"/>
-            <a:ext cx="1627238" cy="2005840"/>
+            <a:off x="4850446" y="244301"/>
+            <a:ext cx="1948199" cy="2401478"/>
           </a:xfrm>
           <a:prstGeom prst="rect">
             <a:avLst/>
@@ -30173,7 +30452,7 @@
             <a:pPr algn="ctr"/>
             <a:r>
               <a:rPr lang="en-US" sz="6600" dirty="0"/>
-              <a:t>003</a:t>
+              <a:t>002</a:t>
             </a:r>
           </a:p>
         </p:txBody>
@@ -30194,8 +30473,8 @@
         </p:nvSpPr>
         <p:spPr>
           <a:xfrm>
-            <a:off x="241658" y="3792071"/>
-            <a:ext cx="6362465" cy="1755552"/>
+            <a:off x="241658" y="3662661"/>
+            <a:ext cx="6953051" cy="1884962"/>
           </a:xfrm>
           <a:prstGeom prst="rect">
             <a:avLst/>
@@ -30286,34 +30565,14 @@
                 <a:latin typeface="Arial" panose="020B0604020202020204" pitchFamily="34" charset="0"/>
                 <a:cs typeface="Arial" panose="020B0604020202020204" pitchFamily="34" charset="0"/>
               </a:rPr>
-              <a:t>2. </a:t>
+              <a:t>1. Octave</a:t>
             </a:r>
             <a:r>
               <a:rPr lang="zh-CN" altLang="en-US" sz="4400" dirty="0">
                 <a:latin typeface="Arial" panose="020B0604020202020204" pitchFamily="34" charset="0"/>
                 <a:cs typeface="Arial" panose="020B0604020202020204" pitchFamily="34" charset="0"/>
               </a:rPr>
-              <a:t>消防所选址问题</a:t>
-            </a:r>
-            <a:endParaRPr lang="en-US" altLang="zh-CN" sz="4400" dirty="0">
-              <a:latin typeface="Arial" panose="020B0604020202020204" pitchFamily="34" charset="0"/>
-              <a:cs typeface="Arial" panose="020B0604020202020204" pitchFamily="34" charset="0"/>
-            </a:endParaRPr>
-          </a:p>
-          <a:p>
-            <a:r>
-              <a:rPr lang="en-US" sz="4400" dirty="0">
-                <a:latin typeface="Arial" panose="020B0604020202020204" pitchFamily="34" charset="0"/>
-                <a:cs typeface="Arial" panose="020B0604020202020204" pitchFamily="34" charset="0"/>
-              </a:rPr>
-              <a:t>2.1 </a:t>
-            </a:r>
-            <a:r>
-              <a:rPr lang="zh-CN" altLang="en-US" sz="4400" dirty="0">
-                <a:latin typeface="Arial" panose="020B0604020202020204" pitchFamily="34" charset="0"/>
-                <a:cs typeface="Arial" panose="020B0604020202020204" pitchFamily="34" charset="0"/>
-              </a:rPr>
-              <a:t>出租车距离的定义和例题</a:t>
+              <a:t>的安装和使用</a:t>
             </a:r>
             <a:endParaRPr lang="en-US" sz="4400" dirty="0">
               <a:latin typeface="Arial" panose="020B0604020202020204" pitchFamily="34" charset="0"/>
@@ -30324,10 +30583,10 @@
       </p:sp>
       <p:pic>
         <p:nvPicPr>
-          <p:cNvPr id="7" name="Picture 6">
-            <a:extLst>
-              <a:ext uri="{FF2B5EF4-FFF2-40B4-BE49-F238E27FC236}">
-                <a16:creationId xmlns:a16="http://schemas.microsoft.com/office/drawing/2014/main" id="{169A5E06-6E3A-14FE-F03C-9D5A484A55A5}"/>
+          <p:cNvPr id="4" name="Picture 3">
+            <a:extLst>
+              <a:ext uri="{FF2B5EF4-FFF2-40B4-BE49-F238E27FC236}">
+                <a16:creationId xmlns:a16="http://schemas.microsoft.com/office/drawing/2014/main" id="{909E2C25-2993-E165-73AA-7BF51BB47383}"/>
               </a:ext>
             </a:extLst>
           </p:cNvPr>
@@ -30344,22 +30603,12 @@
         </p:blipFill>
         <p:spPr>
           <a:xfrm>
-            <a:off x="6604123" y="1389529"/>
-            <a:ext cx="5346218" cy="4158093"/>
+            <a:off x="7428323" y="2038641"/>
+            <a:ext cx="4289196" cy="2919858"/>
           </a:xfrm>
           <a:prstGeom prst="rect">
             <a:avLst/>
           </a:prstGeom>
-          <a:ln>
-            <a:noFill/>
-          </a:ln>
-          <a:effectLst>
-            <a:outerShdw blurRad="292100" dist="139700" dir="2700000" algn="tl" rotWithShape="0">
-              <a:srgbClr val="333333">
-                <a:alpha val="65000"/>
-              </a:srgbClr>
-            </a:outerShdw>
-          </a:effectLst>
         </p:spPr>
       </p:pic>
       <p:pic>
@@ -30367,7 +30616,7 @@
           <p:cNvPr id="3" name="Picture 2">
             <a:extLst>
               <a:ext uri="{FF2B5EF4-FFF2-40B4-BE49-F238E27FC236}">
-                <a16:creationId xmlns:a16="http://schemas.microsoft.com/office/drawing/2014/main" id="{598BF6A6-E87F-DCE9-B898-2692E8D50A49}"/>
+                <a16:creationId xmlns:a16="http://schemas.microsoft.com/office/drawing/2014/main" id="{879A8606-D9E7-465D-0065-C93981061B03}"/>
               </a:ext>
             </a:extLst>
           </p:cNvPr>
@@ -30395,7 +30644,7 @@
     </p:spTree>
     <p:extLst>
       <p:ext uri="{BB962C8B-B14F-4D97-AF65-F5344CB8AC3E}">
-        <p14:creationId xmlns:p14="http://schemas.microsoft.com/office/powerpoint/2010/main" val="2565175440"/>
+        <p14:creationId xmlns:p14="http://schemas.microsoft.com/office/powerpoint/2010/main" val="3909585765"/>
       </p:ext>
     </p:extLst>
   </p:cSld>
@@ -30659,7 +30908,7 @@
             <a:pPr algn="ctr"/>
             <a:r>
               <a:rPr lang="en-US" sz="6600" dirty="0"/>
-              <a:t>004</a:t>
+              <a:t>003</a:t>
             </a:r>
           </a:p>
         </p:txBody>
@@ -30768,88 +31017,40 @@
           </a:lstStyle>
           <a:p>
             <a:r>
-              <a:rPr lang="en-US" altLang="zh-CN" sz="4000" dirty="0">
+              <a:rPr lang="en-US" altLang="zh-CN" sz="4400" dirty="0">
                 <a:latin typeface="Arial" panose="020B0604020202020204" pitchFamily="34" charset="0"/>
                 <a:cs typeface="Arial" panose="020B0604020202020204" pitchFamily="34" charset="0"/>
               </a:rPr>
               <a:t>2. </a:t>
             </a:r>
             <a:r>
-              <a:rPr lang="zh-CN" altLang="en-US" sz="4000" dirty="0">
+              <a:rPr lang="zh-CN" altLang="en-US" sz="4400" dirty="0">
                 <a:latin typeface="Arial" panose="020B0604020202020204" pitchFamily="34" charset="0"/>
                 <a:cs typeface="Arial" panose="020B0604020202020204" pitchFamily="34" charset="0"/>
               </a:rPr>
               <a:t>消防所选址问题</a:t>
             </a:r>
-            <a:endParaRPr lang="en-US" altLang="zh-CN" sz="4000" dirty="0">
+            <a:endParaRPr lang="en-US" altLang="zh-CN" sz="4400" dirty="0">
               <a:latin typeface="Arial" panose="020B0604020202020204" pitchFamily="34" charset="0"/>
               <a:cs typeface="Arial" panose="020B0604020202020204" pitchFamily="34" charset="0"/>
             </a:endParaRPr>
           </a:p>
           <a:p>
             <a:r>
-              <a:rPr lang="en-US" sz="4000" dirty="0">
+              <a:rPr lang="en-US" sz="4400" dirty="0">
                 <a:latin typeface="Arial" panose="020B0604020202020204" pitchFamily="34" charset="0"/>
                 <a:cs typeface="Arial" panose="020B0604020202020204" pitchFamily="34" charset="0"/>
               </a:rPr>
-              <a:t>2.2 </a:t>
-            </a:r>
-            <a:r>
-              <a:rPr lang="zh-CN" altLang="en-US" sz="4000" dirty="0">
+              <a:t>2.1 </a:t>
+            </a:r>
+            <a:r>
+              <a:rPr lang="zh-CN" altLang="en-US" sz="4400" dirty="0">
                 <a:latin typeface="Arial" panose="020B0604020202020204" pitchFamily="34" charset="0"/>
                 <a:cs typeface="Arial" panose="020B0604020202020204" pitchFamily="34" charset="0"/>
               </a:rPr>
-              <a:t>用</a:t>
-            </a:r>
-            <a:r>
-              <a:rPr lang="en-US" altLang="zh-CN" sz="4000" dirty="0">
-                <a:latin typeface="Arial" panose="020B0604020202020204" pitchFamily="34" charset="0"/>
-                <a:cs typeface="Arial" panose="020B0604020202020204" pitchFamily="34" charset="0"/>
-              </a:rPr>
-              <a:t>Octave</a:t>
-            </a:r>
-            <a:r>
-              <a:rPr lang="zh-CN" altLang="en-US" sz="4000" dirty="0">
-                <a:latin typeface="Arial" panose="020B0604020202020204" pitchFamily="34" charset="0"/>
-                <a:cs typeface="Arial" panose="020B0604020202020204" pitchFamily="34" charset="0"/>
-              </a:rPr>
-              <a:t>解题</a:t>
-            </a:r>
-            <a:endParaRPr lang="en-US" altLang="zh-CN" sz="4000" dirty="0">
-              <a:latin typeface="Arial" panose="020B0604020202020204" pitchFamily="34" charset="0"/>
-              <a:cs typeface="Arial" panose="020B0604020202020204" pitchFamily="34" charset="0"/>
-            </a:endParaRPr>
-          </a:p>
-          <a:p>
-            <a:r>
-              <a:rPr lang="en-US" sz="2800" dirty="0">
-                <a:latin typeface="Arial" panose="020B0604020202020204" pitchFamily="34" charset="0"/>
-                <a:cs typeface="Arial" panose="020B0604020202020204" pitchFamily="34" charset="0"/>
-              </a:rPr>
-              <a:t>2.2.1 </a:t>
-            </a:r>
-            <a:r>
-              <a:rPr lang="zh-CN" altLang="en-US" sz="2800" dirty="0">
-                <a:latin typeface="Arial" panose="020B0604020202020204" pitchFamily="34" charset="0"/>
-                <a:cs typeface="Arial" panose="020B0604020202020204" pitchFamily="34" charset="0"/>
-              </a:rPr>
-              <a:t>本章中使用的</a:t>
-            </a:r>
-            <a:r>
-              <a:rPr lang="en-US" sz="2800" dirty="0">
-                <a:latin typeface="Arial" panose="020B0604020202020204" pitchFamily="34" charset="0"/>
-                <a:cs typeface="Arial" panose="020B0604020202020204" pitchFamily="34" charset="0"/>
-              </a:rPr>
-              <a:t>Octave</a:t>
-            </a:r>
-            <a:r>
-              <a:rPr lang="zh-CN" altLang="en-US" sz="2800" dirty="0">
-                <a:latin typeface="Arial" panose="020B0604020202020204" pitchFamily="34" charset="0"/>
-                <a:cs typeface="Arial" panose="020B0604020202020204" pitchFamily="34" charset="0"/>
-              </a:rPr>
-              <a:t>的语句</a:t>
-            </a:r>
-            <a:endParaRPr lang="en-US" sz="4000" dirty="0">
+              <a:t>出租车距离的定义和例题</a:t>
+            </a:r>
+            <a:endParaRPr lang="en-US" sz="4400" dirty="0">
               <a:latin typeface="Arial" panose="020B0604020202020204" pitchFamily="34" charset="0"/>
               <a:cs typeface="Arial" panose="020B0604020202020204" pitchFamily="34" charset="0"/>
             </a:endParaRPr>
@@ -30858,10 +31059,10 @@
       </p:sp>
       <p:pic>
         <p:nvPicPr>
-          <p:cNvPr id="4" name="Picture 3">
-            <a:extLst>
-              <a:ext uri="{FF2B5EF4-FFF2-40B4-BE49-F238E27FC236}">
-                <a16:creationId xmlns:a16="http://schemas.microsoft.com/office/drawing/2014/main" id="{DFCEAF9D-FCB1-3A70-03B2-99F07504CFE2}"/>
+          <p:cNvPr id="7" name="Picture 6">
+            <a:extLst>
+              <a:ext uri="{FF2B5EF4-FFF2-40B4-BE49-F238E27FC236}">
+                <a16:creationId xmlns:a16="http://schemas.microsoft.com/office/drawing/2014/main" id="{169A5E06-6E3A-14FE-F03C-9D5A484A55A5}"/>
               </a:ext>
             </a:extLst>
           </p:cNvPr>
@@ -30878,8 +31079,8 @@
         </p:blipFill>
         <p:spPr>
           <a:xfrm>
-            <a:off x="6028131" y="2225634"/>
-            <a:ext cx="6096000" cy="3125051"/>
+            <a:off x="6604123" y="1389529"/>
+            <a:ext cx="5346218" cy="4158093"/>
           </a:xfrm>
           <a:prstGeom prst="rect">
             <a:avLst/>
@@ -30901,7 +31102,7 @@
           <p:cNvPr id="3" name="Picture 2">
             <a:extLst>
               <a:ext uri="{FF2B5EF4-FFF2-40B4-BE49-F238E27FC236}">
-                <a16:creationId xmlns:a16="http://schemas.microsoft.com/office/drawing/2014/main" id="{EA812233-5C53-2869-613D-4EA3477DFE1F}"/>
+                <a16:creationId xmlns:a16="http://schemas.microsoft.com/office/drawing/2014/main" id="{598BF6A6-E87F-DCE9-B898-2692E8D50A49}"/>
               </a:ext>
             </a:extLst>
           </p:cNvPr>
@@ -30929,7 +31130,7 @@
     </p:spTree>
     <p:extLst>
       <p:ext uri="{BB962C8B-B14F-4D97-AF65-F5344CB8AC3E}">
-        <p14:creationId xmlns:p14="http://schemas.microsoft.com/office/powerpoint/2010/main" val="3618517194"/>
+        <p14:creationId xmlns:p14="http://schemas.microsoft.com/office/powerpoint/2010/main" val="2565175440"/>
       </p:ext>
     </p:extLst>
   </p:cSld>
@@ -31193,7 +31394,7 @@
             <a:pPr algn="ctr"/>
             <a:r>
               <a:rPr lang="en-US" sz="6600" dirty="0"/>
-              <a:t>005</a:t>
+              <a:t>004</a:t>
             </a:r>
           </a:p>
         </p:txBody>
@@ -31356,18 +31557,32 @@
           </a:p>
           <a:p>
             <a:r>
-              <a:rPr lang="en-US" sz="2400" dirty="0">
+              <a:rPr lang="en-US" sz="2800" dirty="0">
                 <a:latin typeface="Arial" panose="020B0604020202020204" pitchFamily="34" charset="0"/>
                 <a:cs typeface="Arial" panose="020B0604020202020204" pitchFamily="34" charset="0"/>
               </a:rPr>
-              <a:t>2.2.2 </a:t>
-            </a:r>
-            <a:r>
-              <a:rPr lang="zh-CN" altLang="en-US" sz="2400" dirty="0">
+              <a:t>2.2.1 </a:t>
+            </a:r>
+            <a:r>
+              <a:rPr lang="zh-CN" altLang="en-US" sz="2800" dirty="0">
                 <a:latin typeface="Arial" panose="020B0604020202020204" pitchFamily="34" charset="0"/>
                 <a:cs typeface="Arial" panose="020B0604020202020204" pitchFamily="34" charset="0"/>
               </a:rPr>
-              <a:t>随机点与特定点的出租车距离计算</a:t>
+              <a:t>本章中使用的</a:t>
+            </a:r>
+            <a:r>
+              <a:rPr lang="en-US" sz="2800" dirty="0">
+                <a:latin typeface="Arial" panose="020B0604020202020204" pitchFamily="34" charset="0"/>
+                <a:cs typeface="Arial" panose="020B0604020202020204" pitchFamily="34" charset="0"/>
+              </a:rPr>
+              <a:t>Octave</a:t>
+            </a:r>
+            <a:r>
+              <a:rPr lang="zh-CN" altLang="en-US" sz="2800" dirty="0">
+                <a:latin typeface="Arial" panose="020B0604020202020204" pitchFamily="34" charset="0"/>
+                <a:cs typeface="Arial" panose="020B0604020202020204" pitchFamily="34" charset="0"/>
+              </a:rPr>
+              <a:t>的语句</a:t>
             </a:r>
             <a:endParaRPr lang="en-US" sz="4000" dirty="0">
               <a:latin typeface="Arial" panose="020B0604020202020204" pitchFamily="34" charset="0"/>
@@ -31378,10 +31593,10 @@
       </p:sp>
       <p:pic>
         <p:nvPicPr>
-          <p:cNvPr id="13" name="Picture 12">
-            <a:extLst>
-              <a:ext uri="{FF2B5EF4-FFF2-40B4-BE49-F238E27FC236}">
-                <a16:creationId xmlns:a16="http://schemas.microsoft.com/office/drawing/2014/main" id="{E1072E77-FDE5-2170-F436-5864F093B36B}"/>
+          <p:cNvPr id="4" name="Picture 3">
+            <a:extLst>
+              <a:ext uri="{FF2B5EF4-FFF2-40B4-BE49-F238E27FC236}">
+                <a16:creationId xmlns:a16="http://schemas.microsoft.com/office/drawing/2014/main" id="{DFCEAF9D-FCB1-3A70-03B2-99F07504CFE2}"/>
               </a:ext>
             </a:extLst>
           </p:cNvPr>
@@ -31398,8 +31613,8 @@
         </p:blipFill>
         <p:spPr>
           <a:xfrm>
-            <a:off x="6307305" y="3011008"/>
-            <a:ext cx="5741259" cy="2393970"/>
+            <a:off x="6028131" y="2225634"/>
+            <a:ext cx="6096000" cy="3125051"/>
           </a:xfrm>
           <a:prstGeom prst="rect">
             <a:avLst/>
@@ -31418,10 +31633,10 @@
       </p:pic>
       <p:pic>
         <p:nvPicPr>
-          <p:cNvPr id="15" name="Picture 14">
-            <a:extLst>
-              <a:ext uri="{FF2B5EF4-FFF2-40B4-BE49-F238E27FC236}">
-                <a16:creationId xmlns:a16="http://schemas.microsoft.com/office/drawing/2014/main" id="{87005F0F-B397-BCF0-D367-76DE829E0108}"/>
+          <p:cNvPr id="3" name="Picture 2">
+            <a:extLst>
+              <a:ext uri="{FF2B5EF4-FFF2-40B4-BE49-F238E27FC236}">
+                <a16:creationId xmlns:a16="http://schemas.microsoft.com/office/drawing/2014/main" id="{EA812233-5C53-2869-613D-4EA3477DFE1F}"/>
               </a:ext>
             </a:extLst>
           </p:cNvPr>
@@ -31438,47 +31653,7 @@
         </p:blipFill>
         <p:spPr>
           <a:xfrm>
-            <a:off x="9799462" y="474392"/>
-            <a:ext cx="1744139" cy="2393971"/>
-          </a:xfrm>
-          <a:prstGeom prst="rect">
-            <a:avLst/>
-          </a:prstGeom>
-          <a:ln>
-            <a:noFill/>
-          </a:ln>
-          <a:effectLst>
-            <a:outerShdw blurRad="292100" dist="139700" dir="2700000" algn="tl" rotWithShape="0">
-              <a:srgbClr val="333333">
-                <a:alpha val="65000"/>
-              </a:srgbClr>
-            </a:outerShdw>
-          </a:effectLst>
-        </p:spPr>
-      </p:pic>
-      <p:pic>
-        <p:nvPicPr>
-          <p:cNvPr id="3" name="Picture 2">
-            <a:extLst>
-              <a:ext uri="{FF2B5EF4-FFF2-40B4-BE49-F238E27FC236}">
-                <a16:creationId xmlns:a16="http://schemas.microsoft.com/office/drawing/2014/main" id="{E8672B36-1817-040B-B2C6-DC02BDE88D8A}"/>
-              </a:ext>
-            </a:extLst>
-          </p:cNvPr>
-          <p:cNvPicPr>
-            <a:picLocks noChangeAspect="1"/>
-          </p:cNvPicPr>
-          <p:nvPr/>
-        </p:nvPicPr>
-        <p:blipFill>
-          <a:blip r:embed="rId8"/>
-          <a:stretch>
-            <a:fillRect/>
-          </a:stretch>
-        </p:blipFill>
-        <p:spPr>
-          <a:xfrm>
-            <a:off x="6895470" y="405553"/>
+            <a:off x="9029070" y="423768"/>
             <a:ext cx="2714625" cy="666750"/>
           </a:xfrm>
           <a:prstGeom prst="rect">
@@ -31489,7 +31664,7 @@
     </p:spTree>
     <p:extLst>
       <p:ext uri="{BB962C8B-B14F-4D97-AF65-F5344CB8AC3E}">
-        <p14:creationId xmlns:p14="http://schemas.microsoft.com/office/powerpoint/2010/main" val="2177113670"/>
+        <p14:creationId xmlns:p14="http://schemas.microsoft.com/office/powerpoint/2010/main" val="3618517194"/>
       </p:ext>
     </p:extLst>
   </p:cSld>
@@ -31753,7 +31928,7 @@
             <a:pPr algn="ctr"/>
             <a:r>
               <a:rPr lang="en-US" sz="6600" dirty="0"/>
-              <a:t>006</a:t>
+              <a:t>005</a:t>
             </a:r>
           </a:p>
         </p:txBody>
@@ -31916,20 +32091,20 @@
           </a:p>
           <a:p>
             <a:r>
-              <a:rPr lang="en-US" sz="3600" dirty="0">
+              <a:rPr lang="en-US" sz="2400" dirty="0">
                 <a:latin typeface="Arial" panose="020B0604020202020204" pitchFamily="34" charset="0"/>
                 <a:cs typeface="Arial" panose="020B0604020202020204" pitchFamily="34" charset="0"/>
               </a:rPr>
-              <a:t>2.2.3 </a:t>
-            </a:r>
-            <a:r>
-              <a:rPr lang="zh-CN" altLang="en-US" sz="3600" dirty="0">
+              <a:t>2.2.2 </a:t>
+            </a:r>
+            <a:r>
+              <a:rPr lang="zh-CN" altLang="en-US" sz="2400" dirty="0">
                 <a:latin typeface="Arial" panose="020B0604020202020204" pitchFamily="34" charset="0"/>
                 <a:cs typeface="Arial" panose="020B0604020202020204" pitchFamily="34" charset="0"/>
               </a:rPr>
-              <a:t>寻找随机向量的最小值</a:t>
-            </a:r>
-            <a:endParaRPr lang="en-US" sz="5400" dirty="0">
+              <a:t>随机点与特定点的出租车距离计算</a:t>
+            </a:r>
+            <a:endParaRPr lang="en-US" sz="4000" dirty="0">
               <a:latin typeface="Arial" panose="020B0604020202020204" pitchFamily="34" charset="0"/>
               <a:cs typeface="Arial" panose="020B0604020202020204" pitchFamily="34" charset="0"/>
             </a:endParaRPr>
@@ -31938,10 +32113,10 @@
       </p:sp>
       <p:pic>
         <p:nvPicPr>
-          <p:cNvPr id="4" name="Picture 3">
-            <a:extLst>
-              <a:ext uri="{FF2B5EF4-FFF2-40B4-BE49-F238E27FC236}">
-                <a16:creationId xmlns:a16="http://schemas.microsoft.com/office/drawing/2014/main" id="{CA6697F2-ABD8-05C5-5210-10399919FF1A}"/>
+          <p:cNvPr id="13" name="Picture 12">
+            <a:extLst>
+              <a:ext uri="{FF2B5EF4-FFF2-40B4-BE49-F238E27FC236}">
+                <a16:creationId xmlns:a16="http://schemas.microsoft.com/office/drawing/2014/main" id="{E1072E77-FDE5-2170-F436-5864F093B36B}"/>
               </a:ext>
             </a:extLst>
           </p:cNvPr>
@@ -31958,8 +32133,8 @@
         </p:blipFill>
         <p:spPr>
           <a:xfrm>
-            <a:off x="6477685" y="2250141"/>
-            <a:ext cx="5558118" cy="2638822"/>
+            <a:off x="6307305" y="3011008"/>
+            <a:ext cx="5741259" cy="2393970"/>
           </a:xfrm>
           <a:prstGeom prst="rect">
             <a:avLst/>
@@ -31978,10 +32153,10 @@
       </p:pic>
       <p:pic>
         <p:nvPicPr>
-          <p:cNvPr id="7" name="Picture 6">
-            <a:extLst>
-              <a:ext uri="{FF2B5EF4-FFF2-40B4-BE49-F238E27FC236}">
-                <a16:creationId xmlns:a16="http://schemas.microsoft.com/office/drawing/2014/main" id="{6D663346-9974-9F14-819A-4494E1972685}"/>
+          <p:cNvPr id="15" name="Picture 14">
+            <a:extLst>
+              <a:ext uri="{FF2B5EF4-FFF2-40B4-BE49-F238E27FC236}">
+                <a16:creationId xmlns:a16="http://schemas.microsoft.com/office/drawing/2014/main" id="{87005F0F-B397-BCF0-D367-76DE829E0108}"/>
               </a:ext>
             </a:extLst>
           </p:cNvPr>
@@ -31998,7 +32173,47 @@
         </p:blipFill>
         <p:spPr>
           <a:xfrm>
-            <a:off x="9029070" y="423768"/>
+            <a:off x="9799462" y="474392"/>
+            <a:ext cx="1744139" cy="2393971"/>
+          </a:xfrm>
+          <a:prstGeom prst="rect">
+            <a:avLst/>
+          </a:prstGeom>
+          <a:ln>
+            <a:noFill/>
+          </a:ln>
+          <a:effectLst>
+            <a:outerShdw blurRad="292100" dist="139700" dir="2700000" algn="tl" rotWithShape="0">
+              <a:srgbClr val="333333">
+                <a:alpha val="65000"/>
+              </a:srgbClr>
+            </a:outerShdw>
+          </a:effectLst>
+        </p:spPr>
+      </p:pic>
+      <p:pic>
+        <p:nvPicPr>
+          <p:cNvPr id="3" name="Picture 2">
+            <a:extLst>
+              <a:ext uri="{FF2B5EF4-FFF2-40B4-BE49-F238E27FC236}">
+                <a16:creationId xmlns:a16="http://schemas.microsoft.com/office/drawing/2014/main" id="{E8672B36-1817-040B-B2C6-DC02BDE88D8A}"/>
+              </a:ext>
+            </a:extLst>
+          </p:cNvPr>
+          <p:cNvPicPr>
+            <a:picLocks noChangeAspect="1"/>
+          </p:cNvPicPr>
+          <p:nvPr/>
+        </p:nvPicPr>
+        <p:blipFill>
+          <a:blip r:embed="rId8"/>
+          <a:stretch>
+            <a:fillRect/>
+          </a:stretch>
+        </p:blipFill>
+        <p:spPr>
+          <a:xfrm>
+            <a:off x="6895470" y="405553"/>
             <a:ext cx="2714625" cy="666750"/>
           </a:xfrm>
           <a:prstGeom prst="rect">
@@ -32009,7 +32224,7 @@
     </p:spTree>
     <p:extLst>
       <p:ext uri="{BB962C8B-B14F-4D97-AF65-F5344CB8AC3E}">
-        <p14:creationId xmlns:p14="http://schemas.microsoft.com/office/powerpoint/2010/main" val="491616866"/>
+        <p14:creationId xmlns:p14="http://schemas.microsoft.com/office/powerpoint/2010/main" val="2177113670"/>
       </p:ext>
     </p:extLst>
   </p:cSld>
@@ -32273,7 +32488,7 @@
             <a:pPr algn="ctr"/>
             <a:r>
               <a:rPr lang="en-US" sz="6600" dirty="0"/>
-              <a:t>007</a:t>
+              <a:t>006</a:t>
             </a:r>
           </a:p>
         </p:txBody>
@@ -32440,14 +32655,14 @@
                 <a:latin typeface="Arial" panose="020B0604020202020204" pitchFamily="34" charset="0"/>
                 <a:cs typeface="Arial" panose="020B0604020202020204" pitchFamily="34" charset="0"/>
               </a:rPr>
-              <a:t>2.2.4 </a:t>
+              <a:t>2.2.3 </a:t>
             </a:r>
             <a:r>
               <a:rPr lang="zh-CN" altLang="en-US" sz="3600" dirty="0">
                 <a:latin typeface="Arial" panose="020B0604020202020204" pitchFamily="34" charset="0"/>
                 <a:cs typeface="Arial" panose="020B0604020202020204" pitchFamily="34" charset="0"/>
               </a:rPr>
-              <a:t>寻找随机矩阵中的最小值</a:t>
+              <a:t>寻找随机向量的最小值</a:t>
             </a:r>
             <a:endParaRPr lang="en-US" sz="5400" dirty="0">
               <a:latin typeface="Arial" panose="020B0604020202020204" pitchFamily="34" charset="0"/>
@@ -32458,10 +32673,10 @@
       </p:sp>
       <p:pic>
         <p:nvPicPr>
-          <p:cNvPr id="7" name="Picture 6">
-            <a:extLst>
-              <a:ext uri="{FF2B5EF4-FFF2-40B4-BE49-F238E27FC236}">
-                <a16:creationId xmlns:a16="http://schemas.microsoft.com/office/drawing/2014/main" id="{F73BEC23-C890-D058-DFBC-0B8262A76B8B}"/>
+          <p:cNvPr id="4" name="Picture 3">
+            <a:extLst>
+              <a:ext uri="{FF2B5EF4-FFF2-40B4-BE49-F238E27FC236}">
+                <a16:creationId xmlns:a16="http://schemas.microsoft.com/office/drawing/2014/main" id="{CA6697F2-ABD8-05C5-5210-10399919FF1A}"/>
               </a:ext>
             </a:extLst>
           </p:cNvPr>
@@ -32478,8 +32693,8 @@
         </p:blipFill>
         <p:spPr>
           <a:xfrm>
-            <a:off x="6553588" y="2250141"/>
-            <a:ext cx="5396753" cy="2608239"/>
+            <a:off x="6477685" y="2250141"/>
+            <a:ext cx="5558118" cy="2638822"/>
           </a:xfrm>
           <a:prstGeom prst="rect">
             <a:avLst/>
@@ -32498,10 +32713,10 @@
       </p:pic>
       <p:pic>
         <p:nvPicPr>
-          <p:cNvPr id="11" name="Picture 10">
-            <a:extLst>
-              <a:ext uri="{FF2B5EF4-FFF2-40B4-BE49-F238E27FC236}">
-                <a16:creationId xmlns:a16="http://schemas.microsoft.com/office/drawing/2014/main" id="{16FFAF40-C7C3-81F4-64CA-AB1B6B9B27C1}"/>
+          <p:cNvPr id="7" name="Picture 6">
+            <a:extLst>
+              <a:ext uri="{FF2B5EF4-FFF2-40B4-BE49-F238E27FC236}">
+                <a16:creationId xmlns:a16="http://schemas.microsoft.com/office/drawing/2014/main" id="{6D663346-9974-9F14-819A-4494E1972685}"/>
               </a:ext>
             </a:extLst>
           </p:cNvPr>
@@ -32529,7 +32744,7 @@
     </p:spTree>
     <p:extLst>
       <p:ext uri="{BB962C8B-B14F-4D97-AF65-F5344CB8AC3E}">
-        <p14:creationId xmlns:p14="http://schemas.microsoft.com/office/powerpoint/2010/main" val="1847345882"/>
+        <p14:creationId xmlns:p14="http://schemas.microsoft.com/office/powerpoint/2010/main" val="491616866"/>
       </p:ext>
     </p:extLst>
   </p:cSld>
@@ -32793,7 +33008,7 @@
             <a:pPr algn="ctr"/>
             <a:r>
               <a:rPr lang="en-US" sz="6600" dirty="0"/>
-              <a:t>008</a:t>
+              <a:t>007</a:t>
             </a:r>
           </a:p>
         </p:txBody>
@@ -32960,14 +33175,14 @@
                 <a:latin typeface="Arial" panose="020B0604020202020204" pitchFamily="34" charset="0"/>
                 <a:cs typeface="Arial" panose="020B0604020202020204" pitchFamily="34" charset="0"/>
               </a:rPr>
-              <a:t>2.2.5 </a:t>
+              <a:t>2.2.4 </a:t>
             </a:r>
             <a:r>
               <a:rPr lang="zh-CN" altLang="en-US" sz="3600" dirty="0">
                 <a:latin typeface="Arial" panose="020B0604020202020204" pitchFamily="34" charset="0"/>
                 <a:cs typeface="Arial" panose="020B0604020202020204" pitchFamily="34" charset="0"/>
               </a:rPr>
-              <a:t>寻找消防所的最佳位置</a:t>
+              <a:t>寻找随机矩阵中的最小值</a:t>
             </a:r>
             <a:endParaRPr lang="en-US" sz="5400" dirty="0">
               <a:latin typeface="Arial" panose="020B0604020202020204" pitchFamily="34" charset="0"/>
@@ -32978,10 +33193,10 @@
       </p:sp>
       <p:pic>
         <p:nvPicPr>
-          <p:cNvPr id="11" name="Picture 10">
-            <a:extLst>
-              <a:ext uri="{FF2B5EF4-FFF2-40B4-BE49-F238E27FC236}">
-                <a16:creationId xmlns:a16="http://schemas.microsoft.com/office/drawing/2014/main" id="{16FFAF40-C7C3-81F4-64CA-AB1B6B9B27C1}"/>
+          <p:cNvPr id="7" name="Picture 6">
+            <a:extLst>
+              <a:ext uri="{FF2B5EF4-FFF2-40B4-BE49-F238E27FC236}">
+                <a16:creationId xmlns:a16="http://schemas.microsoft.com/office/drawing/2014/main" id="{F73BEC23-C890-D058-DFBC-0B8262A76B8B}"/>
               </a:ext>
             </a:extLst>
           </p:cNvPr>
@@ -32998,38 +33213,8 @@
         </p:blipFill>
         <p:spPr>
           <a:xfrm>
-            <a:off x="9029070" y="423768"/>
-            <a:ext cx="2714625" cy="666750"/>
-          </a:xfrm>
-          <a:prstGeom prst="rect">
-            <a:avLst/>
-          </a:prstGeom>
-        </p:spPr>
-      </p:pic>
-      <p:pic>
-        <p:nvPicPr>
-          <p:cNvPr id="4" name="Picture 3">
-            <a:extLst>
-              <a:ext uri="{FF2B5EF4-FFF2-40B4-BE49-F238E27FC236}">
-                <a16:creationId xmlns:a16="http://schemas.microsoft.com/office/drawing/2014/main" id="{11A86784-04E5-4894-6D01-CDE8EDC34C0D}"/>
-              </a:ext>
-            </a:extLst>
-          </p:cNvPr>
-          <p:cNvPicPr>
-            <a:picLocks noChangeAspect="1"/>
-          </p:cNvPicPr>
-          <p:nvPr/>
-        </p:nvPicPr>
-        <p:blipFill>
-          <a:blip r:embed="rId7"/>
-          <a:stretch>
-            <a:fillRect/>
-          </a:stretch>
-        </p:blipFill>
-        <p:spPr>
-          <a:xfrm>
-            <a:off x="6477685" y="2227729"/>
-            <a:ext cx="5540119" cy="2658158"/>
+            <a:off x="6553588" y="2250141"/>
+            <a:ext cx="5396753" cy="2608239"/>
           </a:xfrm>
           <a:prstGeom prst="rect">
             <a:avLst/>
@@ -33046,10 +33231,40 @@
           </a:effectLst>
         </p:spPr>
       </p:pic>
+      <p:pic>
+        <p:nvPicPr>
+          <p:cNvPr id="11" name="Picture 10">
+            <a:extLst>
+              <a:ext uri="{FF2B5EF4-FFF2-40B4-BE49-F238E27FC236}">
+                <a16:creationId xmlns:a16="http://schemas.microsoft.com/office/drawing/2014/main" id="{16FFAF40-C7C3-81F4-64CA-AB1B6B9B27C1}"/>
+              </a:ext>
+            </a:extLst>
+          </p:cNvPr>
+          <p:cNvPicPr>
+            <a:picLocks noChangeAspect="1"/>
+          </p:cNvPicPr>
+          <p:nvPr/>
+        </p:nvPicPr>
+        <p:blipFill>
+          <a:blip r:embed="rId7"/>
+          <a:stretch>
+            <a:fillRect/>
+          </a:stretch>
+        </p:blipFill>
+        <p:spPr>
+          <a:xfrm>
+            <a:off x="9029070" y="423768"/>
+            <a:ext cx="2714625" cy="666750"/>
+          </a:xfrm>
+          <a:prstGeom prst="rect">
+            <a:avLst/>
+          </a:prstGeom>
+        </p:spPr>
+      </p:pic>
     </p:spTree>
     <p:extLst>
       <p:ext uri="{BB962C8B-B14F-4D97-AF65-F5344CB8AC3E}">
-        <p14:creationId xmlns:p14="http://schemas.microsoft.com/office/powerpoint/2010/main" val="3968597846"/>
+        <p14:creationId xmlns:p14="http://schemas.microsoft.com/office/powerpoint/2010/main" val="1847345882"/>
       </p:ext>
     </p:extLst>
   </p:cSld>
@@ -33855,6 +34070,26 @@
 </file>
 
 <file path=customXml/item1.xml><?xml version="1.0" encoding="utf-8"?>
+<p:properties xmlns:p="http://schemas.microsoft.com/office/2006/metadata/properties" xmlns:xsi="http://www.w3.org/2001/XMLSchema-instance" xmlns:pc="http://schemas.microsoft.com/office/infopath/2007/PartnerControls">
+  <documentManagement>
+    <_ip_UnifiedCompliancePolicyUIAction xmlns="http://schemas.microsoft.com/sharepoint/v3" xsi:nil="true"/>
+    <Image xmlns="71af3243-3dd4-4a8d-8c0d-dd76da1f02a5">
+      <Url xsi:nil="true"/>
+      <Description xsi:nil="true"/>
+    </Image>
+    <Status xmlns="71af3243-3dd4-4a8d-8c0d-dd76da1f02a5">Not started</Status>
+    <Background xmlns="71af3243-3dd4-4a8d-8c0d-dd76da1f02a5">false</Background>
+    <_ip_UnifiedCompliancePolicyProperties xmlns="http://schemas.microsoft.com/sharepoint/v3" xsi:nil="true"/>
+    <ImageTagsTaxHTField xmlns="71af3243-3dd4-4a8d-8c0d-dd76da1f02a5">
+      <Terms xmlns="http://schemas.microsoft.com/office/infopath/2007/PartnerControls"/>
+    </ImageTagsTaxHTField>
+    <TaxCatchAll xmlns="230e9df3-be65-4c73-a93b-d1236ebd677e" xsi:nil="true"/>
+    <MediaServiceKeyPoints xmlns="71af3243-3dd4-4a8d-8c0d-dd76da1f02a5" xsi:nil="true"/>
+  </documentManagement>
+</p:properties>
+</file>
+
+<file path=customXml/item2.xml><?xml version="1.0" encoding="utf-8"?>
 <ct:contentTypeSchema xmlns:ct="http://schemas.microsoft.com/office/2006/metadata/contentType" xmlns:ma="http://schemas.microsoft.com/office/2006/metadata/properties/metaAttributes" ct:_="" ma:_="" ma:contentTypeName="Document" ma:contentTypeID="0x01010079F111ED35F8CC479449609E8A0923A6" ma:contentTypeVersion="27" ma:contentTypeDescription="Create a new document." ma:contentTypeScope="" ma:versionID="c6f9a84f66a9c8b9a21755b9ffafb945">
   <xsd:schema xmlns:xsd="http://www.w3.org/2001/XMLSchema" xmlns:xs="http://www.w3.org/2001/XMLSchema" xmlns:p="http://schemas.microsoft.com/office/2006/metadata/properties" xmlns:ns1="http://schemas.microsoft.com/sharepoint/v3" xmlns:ns2="71af3243-3dd4-4a8d-8c0d-dd76da1f02a5" xmlns:ns3="16c05727-aa75-4e4a-9b5f-8a80a1165891" xmlns:ns4="230e9df3-be65-4c73-a93b-d1236ebd677e" targetNamespace="http://schemas.microsoft.com/office/2006/metadata/properties" ma:root="true" ma:fieldsID="27df39e3e7036dff54f89ddd5805ce72" ns1:_="" ns2:_="" ns3:_="" ns4:_="">
     <xsd:import namespace="http://schemas.microsoft.com/sharepoint/v3"/>
@@ -34160,7 +34395,7 @@
 </ct:contentTypeSchema>
 </file>
 
-<file path=customXml/item2.xml><?xml version="1.0" encoding="utf-8"?>
+<file path=customXml/item3.xml><?xml version="1.0" encoding="utf-8"?>
 <?mso-contentType ?>
 <FormTemplates xmlns="http://schemas.microsoft.com/sharepoint/v3/contenttype/forms">
   <Display>DocumentLibraryForm</Display>
@@ -34169,27 +34404,19 @@
 </FormTemplates>
 </file>
 
-<file path=customXml/item3.xml><?xml version="1.0" encoding="utf-8"?>
-<p:properties xmlns:p="http://schemas.microsoft.com/office/2006/metadata/properties" xmlns:xsi="http://www.w3.org/2001/XMLSchema-instance" xmlns:pc="http://schemas.microsoft.com/office/infopath/2007/PartnerControls">
-  <documentManagement>
-    <_ip_UnifiedCompliancePolicyUIAction xmlns="http://schemas.microsoft.com/sharepoint/v3" xsi:nil="true"/>
-    <Image xmlns="71af3243-3dd4-4a8d-8c0d-dd76da1f02a5">
-      <Url xsi:nil="true"/>
-      <Description xsi:nil="true"/>
-    </Image>
-    <Status xmlns="71af3243-3dd4-4a8d-8c0d-dd76da1f02a5">Not started</Status>
-    <Background xmlns="71af3243-3dd4-4a8d-8c0d-dd76da1f02a5">false</Background>
-    <_ip_UnifiedCompliancePolicyProperties xmlns="http://schemas.microsoft.com/sharepoint/v3" xsi:nil="true"/>
-    <ImageTagsTaxHTField xmlns="71af3243-3dd4-4a8d-8c0d-dd76da1f02a5">
-      <Terms xmlns="http://schemas.microsoft.com/office/infopath/2007/PartnerControls"/>
-    </ImageTagsTaxHTField>
-    <TaxCatchAll xmlns="230e9df3-be65-4c73-a93b-d1236ebd677e" xsi:nil="true"/>
-    <MediaServiceKeyPoints xmlns="71af3243-3dd4-4a8d-8c0d-dd76da1f02a5" xsi:nil="true"/>
-  </documentManagement>
-</p:properties>
+<file path=customXml/itemProps1.xml><?xml version="1.0" encoding="utf-8"?>
+<ds:datastoreItem xmlns:ds="http://schemas.openxmlformats.org/officeDocument/2006/customXml" ds:itemID="{2732324C-71C3-4F1C-A370-A2665FF5CDF6}">
+  <ds:schemaRefs>
+    <ds:schemaRef ds:uri="http://schemas.microsoft.com/office/2006/metadata/properties"/>
+    <ds:schemaRef ds:uri="http://schemas.microsoft.com/office/infopath/2007/PartnerControls"/>
+    <ds:schemaRef ds:uri="http://schemas.microsoft.com/sharepoint/v3"/>
+    <ds:schemaRef ds:uri="71af3243-3dd4-4a8d-8c0d-dd76da1f02a5"/>
+    <ds:schemaRef ds:uri="230e9df3-be65-4c73-a93b-d1236ebd677e"/>
+  </ds:schemaRefs>
+</ds:datastoreItem>
 </file>
 
-<file path=customXml/itemProps1.xml><?xml version="1.0" encoding="utf-8"?>
+<file path=customXml/itemProps2.xml><?xml version="1.0" encoding="utf-8"?>
 <ds:datastoreItem xmlns:ds="http://schemas.openxmlformats.org/officeDocument/2006/customXml" ds:itemID="{8E3D3917-8912-4844-9F02-0D751C13D815}">
   <ds:schemaRefs>
     <ds:schemaRef ds:uri="http://schemas.microsoft.com/office/2006/metadata/contentType"/>
@@ -34210,7 +34437,7 @@
 </ds:datastoreItem>
 </file>
 
-<file path=customXml/itemProps2.xml><?xml version="1.0" encoding="utf-8"?>
+<file path=customXml/itemProps3.xml><?xml version="1.0" encoding="utf-8"?>
 <ds:datastoreItem xmlns:ds="http://schemas.openxmlformats.org/officeDocument/2006/customXml" ds:itemID="{376DE935-925F-49AD-A9C2-6284C7807A5B}">
   <ds:schemaRefs>
     <ds:schemaRef ds:uri="http://schemas.microsoft.com/sharepoint/v3/contenttype/forms"/>
@@ -34218,18 +34445,6 @@
 </ds:datastoreItem>
 </file>
 
-<file path=customXml/itemProps3.xml><?xml version="1.0" encoding="utf-8"?>
-<ds:datastoreItem xmlns:ds="http://schemas.openxmlformats.org/officeDocument/2006/customXml" ds:itemID="{2732324C-71C3-4F1C-A370-A2665FF5CDF6}">
-  <ds:schemaRefs>
-    <ds:schemaRef ds:uri="http://schemas.microsoft.com/office/2006/metadata/properties"/>
-    <ds:schemaRef ds:uri="http://schemas.microsoft.com/office/infopath/2007/PartnerControls"/>
-    <ds:schemaRef ds:uri="http://schemas.microsoft.com/sharepoint/v3"/>
-    <ds:schemaRef ds:uri="71af3243-3dd4-4a8d-8c0d-dd76da1f02a5"/>
-    <ds:schemaRef ds:uri="230e9df3-be65-4c73-a93b-d1236ebd677e"/>
-  </ds:schemaRefs>
-</ds:datastoreItem>
-</file>
-
 <file path=docMetadata/LabelInfo.xml><?xml version="1.0" encoding="utf-8"?>
 <clbl:labelList xmlns:clbl="http://schemas.microsoft.com/office/2020/mipLabelMetadata"/>
 </file>
</xml_diff>